<commit_message>
Refactor code, add better K selection and clearer result representation
</commit_message>
<xml_diff>
--- a/project/presentation/presentation.pptx
+++ b/project/presentation/presentation.pptx
@@ -5,7 +5,7 @@
     <p:sldMasterId id="2147483711" r:id="rId1"/>
   </p:sldMasterIdLst>
   <p:notesMasterIdLst>
-    <p:notesMasterId r:id="rId17"/>
+    <p:notesMasterId r:id="rId16"/>
   </p:notesMasterIdLst>
   <p:sldIdLst>
     <p:sldId id="256" r:id="rId2"/>
@@ -20,9 +20,8 @@
     <p:sldId id="273" r:id="rId11"/>
     <p:sldId id="261" r:id="rId12"/>
     <p:sldId id="262" r:id="rId13"/>
-    <p:sldId id="271" r:id="rId14"/>
-    <p:sldId id="263" r:id="rId15"/>
-    <p:sldId id="270" r:id="rId16"/>
+    <p:sldId id="263" r:id="rId14"/>
+    <p:sldId id="270" r:id="rId15"/>
   </p:sldIdLst>
   <p:sldSz cx="12192000" cy="6858000"/>
   <p:notesSz cx="6858000" cy="9144000"/>
@@ -1671,6 +1670,932 @@
 </c:chartSpace>
 </file>
 
+<file path=ppt/charts/chart4.xml><?xml version="1.0" encoding="utf-8"?>
+<c:chartSpace xmlns:c="http://schemas.openxmlformats.org/drawingml/2006/chart" xmlns:a="http://schemas.openxmlformats.org/drawingml/2006/main" xmlns:r="http://schemas.openxmlformats.org/officeDocument/2006/relationships" xmlns:c16r2="http://schemas.microsoft.com/office/drawing/2015/06/chart">
+  <c:date1904 val="0"/>
+  <c:lang val="en-US"/>
+  <c:roundedCorners val="0"/>
+  <mc:AlternateContent xmlns:mc="http://schemas.openxmlformats.org/markup-compatibility/2006">
+    <mc:Choice xmlns:c14="http://schemas.microsoft.com/office/drawing/2007/8/2/chart" Requires="c14">
+      <c14:style val="102"/>
+    </mc:Choice>
+    <mc:Fallback>
+      <c:style val="2"/>
+    </mc:Fallback>
+  </mc:AlternateContent>
+  <c:chart>
+    <c:autoTitleDeleted val="0"/>
+    <c:plotArea>
+      <c:layout>
+        <c:manualLayout>
+          <c:layoutTarget val="inner"/>
+          <c:xMode val="edge"/>
+          <c:yMode val="edge"/>
+          <c:x val="3.5322651401094446E-2"/>
+          <c:y val="6.1317539952067956E-2"/>
+          <c:w val="0.92624667779411729"/>
+          <c:h val="0.81262610662413182"/>
+        </c:manualLayout>
+      </c:layout>
+      <c:lineChart>
+        <c:grouping val="standard"/>
+        <c:varyColors val="0"/>
+        <c:ser>
+          <c:idx val="0"/>
+          <c:order val="0"/>
+          <c:tx>
+            <c:strRef>
+              <c:f>Sheet1!$B$1</c:f>
+              <c:strCache>
+                <c:ptCount val="1"/>
+                <c:pt idx="0">
+                  <c:v>RMSE training</c:v>
+                </c:pt>
+              </c:strCache>
+            </c:strRef>
+          </c:tx>
+          <c:spPr>
+            <a:ln w="28575" cap="rnd">
+              <a:solidFill>
+                <a:schemeClr val="accent1"/>
+              </a:solidFill>
+              <a:round/>
+            </a:ln>
+            <a:effectLst/>
+          </c:spPr>
+          <c:marker>
+            <c:symbol val="circle"/>
+            <c:size val="5"/>
+            <c:spPr>
+              <a:solidFill>
+                <a:schemeClr val="accent1"/>
+              </a:solidFill>
+              <a:ln w="9525">
+                <a:solidFill>
+                  <a:schemeClr val="accent1"/>
+                </a:solidFill>
+              </a:ln>
+              <a:effectLst/>
+            </c:spPr>
+          </c:marker>
+          <c:dLbls>
+            <c:dLbl>
+              <c:idx val="0"/>
+              <c:layout>
+                <c:manualLayout>
+                  <c:x val="5.6050002363643272E-3"/>
+                  <c:y val="-2.7175006880008543E-2"/>
+                </c:manualLayout>
+              </c:layout>
+              <c:showLegendKey val="0"/>
+              <c:showVal val="1"/>
+              <c:showCatName val="1"/>
+              <c:showSerName val="0"/>
+              <c:showPercent val="0"/>
+              <c:showBubbleSize val="0"/>
+              <c:extLst>
+                <c:ext xmlns:c15="http://schemas.microsoft.com/office/drawing/2012/chart" uri="{CE6537A1-D6FC-4f65-9D91-7224C49458BB}"/>
+                <c:ext xmlns:c16="http://schemas.microsoft.com/office/drawing/2014/chart" uri="{C3380CC4-5D6E-409C-BE32-E72D297353CC}">
+                  <c16:uniqueId val="{00000000-3D14-443F-B42A-929466DA80F6}"/>
+                </c:ext>
+              </c:extLst>
+            </c:dLbl>
+            <c:dLbl>
+              <c:idx val="1"/>
+              <c:layout>
+                <c:manualLayout>
+                  <c:x val="-0.15554603296649303"/>
+                  <c:y val="0.12335510411364545"/>
+                </c:manualLayout>
+              </c:layout>
+              <c:showLegendKey val="0"/>
+              <c:showVal val="1"/>
+              <c:showCatName val="1"/>
+              <c:showSerName val="0"/>
+              <c:showPercent val="0"/>
+              <c:showBubbleSize val="0"/>
+              <c:extLst>
+                <c:ext xmlns:c15="http://schemas.microsoft.com/office/drawing/2012/chart" uri="{CE6537A1-D6FC-4f65-9D91-7224C49458BB}">
+                  <c15:layout>
+                    <c:manualLayout>
+                      <c:w val="0.11082556062885598"/>
+                      <c:h val="0.12604273071210509"/>
+                    </c:manualLayout>
+                  </c15:layout>
+                </c:ext>
+                <c:ext xmlns:c16="http://schemas.microsoft.com/office/drawing/2014/chart" uri="{C3380CC4-5D6E-409C-BE32-E72D297353CC}">
+                  <c16:uniqueId val="{00000001-3D14-443F-B42A-929466DA80F6}"/>
+                </c:ext>
+              </c:extLst>
+            </c:dLbl>
+            <c:dLbl>
+              <c:idx val="2"/>
+              <c:layout>
+                <c:manualLayout>
+                  <c:x val="-2.1184658104111301E-2"/>
+                  <c:y val="-0.10754270739631724"/>
+                </c:manualLayout>
+              </c:layout>
+              <c:showLegendKey val="0"/>
+              <c:showVal val="1"/>
+              <c:showCatName val="1"/>
+              <c:showSerName val="0"/>
+              <c:showPercent val="0"/>
+              <c:showBubbleSize val="0"/>
+              <c:extLst>
+                <c:ext xmlns:c15="http://schemas.microsoft.com/office/drawing/2012/chart" uri="{CE6537A1-D6FC-4f65-9D91-7224C49458BB}"/>
+                <c:ext xmlns:c16="http://schemas.microsoft.com/office/drawing/2014/chart" uri="{C3380CC4-5D6E-409C-BE32-E72D297353CC}">
+                  <c16:uniqueId val="{00000002-3D14-443F-B42A-929466DA80F6}"/>
+                </c:ext>
+              </c:extLst>
+            </c:dLbl>
+            <c:dLbl>
+              <c:idx val="4"/>
+              <c:layout>
+                <c:manualLayout>
+                  <c:x val="-1.1158863965006496E-2"/>
+                  <c:y val="-5.210517223187805E-2"/>
+                </c:manualLayout>
+              </c:layout>
+              <c:showLegendKey val="0"/>
+              <c:showVal val="1"/>
+              <c:showCatName val="1"/>
+              <c:showSerName val="0"/>
+              <c:showPercent val="0"/>
+              <c:showBubbleSize val="0"/>
+              <c:extLst>
+                <c:ext xmlns:c15="http://schemas.microsoft.com/office/drawing/2012/chart" uri="{CE6537A1-D6FC-4f65-9D91-7224C49458BB}"/>
+                <c:ext xmlns:c16="http://schemas.microsoft.com/office/drawing/2014/chart" uri="{C3380CC4-5D6E-409C-BE32-E72D297353CC}">
+                  <c16:uniqueId val="{00000003-3D14-443F-B42A-929466DA80F6}"/>
+                </c:ext>
+              </c:extLst>
+            </c:dLbl>
+            <c:dLbl>
+              <c:idx val="6"/>
+              <c:layout>
+                <c:manualLayout>
+                  <c:x val="2.4285220932406563E-3"/>
+                  <c:y val="3.6541592436561736E-2"/>
+                </c:manualLayout>
+              </c:layout>
+              <c:showLegendKey val="0"/>
+              <c:showVal val="1"/>
+              <c:showCatName val="1"/>
+              <c:showSerName val="0"/>
+              <c:showPercent val="0"/>
+              <c:showBubbleSize val="0"/>
+              <c:extLst>
+                <c:ext xmlns:c15="http://schemas.microsoft.com/office/drawing/2012/chart" uri="{CE6537A1-D6FC-4f65-9D91-7224C49458BB}"/>
+                <c:ext xmlns:c16="http://schemas.microsoft.com/office/drawing/2014/chart" uri="{C3380CC4-5D6E-409C-BE32-E72D297353CC}">
+                  <c16:uniqueId val="{00000004-3D14-443F-B42A-929466DA80F6}"/>
+                </c:ext>
+              </c:extLst>
+            </c:dLbl>
+            <c:dLbl>
+              <c:idx val="8"/>
+              <c:layout>
+                <c:manualLayout>
+                  <c:x val="-5.4095289772411966E-2"/>
+                  <c:y val="-6.0902574971555788E-2"/>
+                </c:manualLayout>
+              </c:layout>
+              <c:showLegendKey val="0"/>
+              <c:showVal val="1"/>
+              <c:showCatName val="1"/>
+              <c:showSerName val="0"/>
+              <c:showPercent val="0"/>
+              <c:showBubbleSize val="0"/>
+              <c:extLst>
+                <c:ext xmlns:c15="http://schemas.microsoft.com/office/drawing/2012/chart" uri="{CE6537A1-D6FC-4f65-9D91-7224C49458BB}"/>
+                <c:ext xmlns:c16="http://schemas.microsoft.com/office/drawing/2014/chart" uri="{C3380CC4-5D6E-409C-BE32-E72D297353CC}">
+                  <c16:uniqueId val="{00000005-3D14-443F-B42A-929466DA80F6}"/>
+                </c:ext>
+              </c:extLst>
+            </c:dLbl>
+            <c:dLbl>
+              <c:idx val="9"/>
+              <c:layout>
+                <c:manualLayout>
+                  <c:x val="-1.5313492287172051E-16"/>
+                  <c:y val="6.0172102900282853E-2"/>
+                </c:manualLayout>
+              </c:layout>
+              <c:showLegendKey val="0"/>
+              <c:showVal val="1"/>
+              <c:showCatName val="1"/>
+              <c:showSerName val="0"/>
+              <c:showPercent val="0"/>
+              <c:showBubbleSize val="0"/>
+              <c:extLst>
+                <c:ext xmlns:c15="http://schemas.microsoft.com/office/drawing/2012/chart" uri="{CE6537A1-D6FC-4f65-9D91-7224C49458BB}"/>
+                <c:ext xmlns:c16="http://schemas.microsoft.com/office/drawing/2014/chart" uri="{C3380CC4-5D6E-409C-BE32-E72D297353CC}">
+                  <c16:uniqueId val="{00000006-3D14-443F-B42A-929466DA80F6}"/>
+                </c:ext>
+              </c:extLst>
+            </c:dLbl>
+            <c:spPr>
+              <a:solidFill>
+                <a:sysClr val="window" lastClr="FFFFFF"/>
+              </a:solidFill>
+              <a:ln>
+                <a:solidFill>
+                  <a:sysClr val="windowText" lastClr="000000">
+                    <a:lumMod val="25000"/>
+                    <a:lumOff val="75000"/>
+                  </a:sysClr>
+                </a:solidFill>
+              </a:ln>
+              <a:effectLst/>
+            </c:spPr>
+            <c:txPr>
+              <a:bodyPr rot="0" spcFirstLastPara="1" vertOverflow="clip" horzOverflow="clip" vert="horz" wrap="square" lIns="36576" tIns="18288" rIns="36576" bIns="18288" anchor="ctr" anchorCtr="1">
+                <a:spAutoFit/>
+              </a:bodyPr>
+              <a:lstStyle/>
+              <a:p>
+                <a:pPr>
+                  <a:defRPr sz="1050" b="0" i="0" u="none" strike="noStrike" kern="1200" baseline="0">
+                    <a:solidFill>
+                      <a:schemeClr val="dk1">
+                        <a:lumMod val="65000"/>
+                        <a:lumOff val="35000"/>
+                      </a:schemeClr>
+                    </a:solidFill>
+                    <a:latin typeface="+mn-lt"/>
+                    <a:ea typeface="+mn-ea"/>
+                    <a:cs typeface="+mn-cs"/>
+                  </a:defRPr>
+                </a:pPr>
+                <a:endParaRPr lang="en-US"/>
+              </a:p>
+            </c:txPr>
+            <c:showLegendKey val="0"/>
+            <c:showVal val="1"/>
+            <c:showCatName val="1"/>
+            <c:showSerName val="0"/>
+            <c:showPercent val="0"/>
+            <c:showBubbleSize val="0"/>
+            <c:showLeaderLines val="0"/>
+            <c:extLst>
+              <c:ext xmlns:c15="http://schemas.microsoft.com/office/drawing/2012/chart" uri="{CE6537A1-D6FC-4f65-9D91-7224C49458BB}">
+                <c15:spPr xmlns:c15="http://schemas.microsoft.com/office/drawing/2012/chart">
+                  <a:prstGeom prst="wedgeRectCallout">
+                    <a:avLst/>
+                  </a:prstGeom>
+                  <a:noFill/>
+                  <a:ln>
+                    <a:noFill/>
+                  </a:ln>
+                </c15:spPr>
+                <c15:showLeaderLines val="0"/>
+              </c:ext>
+            </c:extLst>
+          </c:dLbls>
+          <c:cat>
+            <c:strRef>
+              <c:f>Sheet1!$A$2:$A$11</c:f>
+              <c:strCache>
+                <c:ptCount val="10"/>
+                <c:pt idx="0">
+                  <c:v>LinearReg Normalized</c:v>
+                </c:pt>
+                <c:pt idx="1">
+                  <c:v>Lasso - Normalized - Alpha = 10000</c:v>
+                </c:pt>
+                <c:pt idx="2">
+                  <c:v>Ridge - Normalized - Alpha = 0.0001</c:v>
+                </c:pt>
+                <c:pt idx="3">
+                  <c:v>Lasso - Alpha = 1000</c:v>
+                </c:pt>
+                <c:pt idx="4">
+                  <c:v>Ridge - Alpha = 0.0001</c:v>
+                </c:pt>
+                <c:pt idx="5">
+                  <c:v>Ridge - Normalized - Alpha = 10000</c:v>
+                </c:pt>
+                <c:pt idx="6">
+                  <c:v>LinearReg</c:v>
+                </c:pt>
+                <c:pt idx="7">
+                  <c:v>Ridge - Alpha = 10000</c:v>
+                </c:pt>
+                <c:pt idx="8">
+                  <c:v>Lasso - Alpha = 0.0001</c:v>
+                </c:pt>
+                <c:pt idx="9">
+                  <c:v>Lasso - Normalized - Alpha = 0.001</c:v>
+                </c:pt>
+              </c:strCache>
+            </c:strRef>
+          </c:cat>
+          <c:val>
+            <c:numRef>
+              <c:f>Sheet1!$B$2:$B$11</c:f>
+              <c:numCache>
+                <c:formatCode>General</c:formatCode>
+                <c:ptCount val="10"/>
+                <c:pt idx="0">
+                  <c:v>4.2308250000000003</c:v>
+                </c:pt>
+                <c:pt idx="1">
+                  <c:v>8.0701470000000004</c:v>
+                </c:pt>
+                <c:pt idx="2">
+                  <c:v>4.2312779999999997</c:v>
+                </c:pt>
+                <c:pt idx="4">
+                  <c:v>4.532076</c:v>
+                </c:pt>
+                <c:pt idx="6">
+                  <c:v>4.5325540000000002</c:v>
+                </c:pt>
+                <c:pt idx="8">
+                  <c:v>5.6378269999999997</c:v>
+                </c:pt>
+                <c:pt idx="9">
+                  <c:v>5.6746290000000004</c:v>
+                </c:pt>
+              </c:numCache>
+            </c:numRef>
+          </c:val>
+          <c:smooth val="0"/>
+          <c:extLst>
+            <c:ext xmlns:c16="http://schemas.microsoft.com/office/drawing/2014/chart" uri="{C3380CC4-5D6E-409C-BE32-E72D297353CC}">
+              <c16:uniqueId val="{00000007-3D14-443F-B42A-929466DA80F6}"/>
+            </c:ext>
+          </c:extLst>
+        </c:ser>
+        <c:ser>
+          <c:idx val="1"/>
+          <c:order val="1"/>
+          <c:tx>
+            <c:strRef>
+              <c:f>Sheet1!$C$1</c:f>
+              <c:strCache>
+                <c:ptCount val="1"/>
+                <c:pt idx="0">
+                  <c:v>RMSE testing</c:v>
+                </c:pt>
+              </c:strCache>
+            </c:strRef>
+          </c:tx>
+          <c:spPr>
+            <a:ln w="28575" cap="rnd">
+              <a:solidFill>
+                <a:schemeClr val="accent2"/>
+              </a:solidFill>
+              <a:round/>
+            </a:ln>
+            <a:effectLst/>
+          </c:spPr>
+          <c:marker>
+            <c:symbol val="circle"/>
+            <c:size val="5"/>
+            <c:spPr>
+              <a:solidFill>
+                <a:schemeClr val="accent2"/>
+              </a:solidFill>
+              <a:ln w="9525">
+                <a:solidFill>
+                  <a:schemeClr val="accent2"/>
+                </a:solidFill>
+              </a:ln>
+              <a:effectLst/>
+            </c:spPr>
+          </c:marker>
+          <c:dLbls>
+            <c:dLbl>
+              <c:idx val="0"/>
+              <c:layout>
+                <c:manualLayout>
+                  <c:x val="-8.3761769402943761E-3"/>
+                  <c:y val="-8.5553460746984111E-2"/>
+                </c:manualLayout>
+              </c:layout>
+              <c:spPr>
+                <a:solidFill>
+                  <a:sysClr val="window" lastClr="FFFFFF"/>
+                </a:solidFill>
+                <a:ln>
+                  <a:solidFill>
+                    <a:sysClr val="windowText" lastClr="000000">
+                      <a:lumMod val="25000"/>
+                      <a:lumOff val="75000"/>
+                    </a:sysClr>
+                  </a:solidFill>
+                </a:ln>
+                <a:effectLst/>
+              </c:spPr>
+              <c:txPr>
+                <a:bodyPr rot="0" spcFirstLastPara="1" vertOverflow="clip" horzOverflow="clip" vert="horz" wrap="square" lIns="36576" tIns="18288" rIns="36576" bIns="18288" anchor="ctr" anchorCtr="1">
+                  <a:spAutoFit/>
+                </a:bodyPr>
+                <a:lstStyle/>
+                <a:p>
+                  <a:pPr>
+                    <a:defRPr sz="1050" b="0" i="0" u="none" strike="noStrike" kern="1200" baseline="0">
+                      <a:solidFill>
+                        <a:schemeClr val="dk1">
+                          <a:lumMod val="65000"/>
+                          <a:lumOff val="35000"/>
+                        </a:schemeClr>
+                      </a:solidFill>
+                      <a:latin typeface="+mn-lt"/>
+                      <a:ea typeface="+mn-ea"/>
+                      <a:cs typeface="+mn-cs"/>
+                    </a:defRPr>
+                  </a:pPr>
+                  <a:endParaRPr lang="en-US"/>
+                </a:p>
+              </c:txPr>
+              <c:showLegendKey val="0"/>
+              <c:showVal val="1"/>
+              <c:showCatName val="1"/>
+              <c:showSerName val="0"/>
+              <c:showPercent val="0"/>
+              <c:showBubbleSize val="0"/>
+              <c:extLst>
+                <c:ext xmlns:c15="http://schemas.microsoft.com/office/drawing/2012/chart" uri="{CE6537A1-D6FC-4f65-9D91-7224C49458BB}">
+                  <c15:spPr xmlns:c15="http://schemas.microsoft.com/office/drawing/2012/chart">
+                    <a:prstGeom prst="wedgeRectCallout">
+                      <a:avLst/>
+                    </a:prstGeom>
+                    <a:noFill/>
+                    <a:ln>
+                      <a:noFill/>
+                    </a:ln>
+                  </c15:spPr>
+                </c:ext>
+                <c:ext xmlns:c16="http://schemas.microsoft.com/office/drawing/2014/chart" uri="{C3380CC4-5D6E-409C-BE32-E72D297353CC}">
+                  <c16:uniqueId val="{00000008-3D14-443F-B42A-929466DA80F6}"/>
+                </c:ext>
+              </c:extLst>
+            </c:dLbl>
+            <c:dLbl>
+              <c:idx val="1"/>
+              <c:layout>
+                <c:manualLayout>
+                  <c:x val="-3.2611898150700092E-2"/>
+                  <c:y val="-8.7307747159034915E-2"/>
+                </c:manualLayout>
+              </c:layout>
+              <c:showLegendKey val="0"/>
+              <c:showVal val="1"/>
+              <c:showCatName val="1"/>
+              <c:showSerName val="0"/>
+              <c:showPercent val="0"/>
+              <c:showBubbleSize val="0"/>
+              <c:extLst>
+                <c:ext xmlns:c15="http://schemas.microsoft.com/office/drawing/2012/chart" uri="{CE6537A1-D6FC-4f65-9D91-7224C49458BB}"/>
+                <c:ext xmlns:c16="http://schemas.microsoft.com/office/drawing/2014/chart" uri="{C3380CC4-5D6E-409C-BE32-E72D297353CC}">
+                  <c16:uniqueId val="{00000009-3D14-443F-B42A-929466DA80F6}"/>
+                </c:ext>
+              </c:extLst>
+            </c:dLbl>
+            <c:dLbl>
+              <c:idx val="3"/>
+              <c:layout>
+                <c:manualLayout>
+                  <c:x val="-4.2094382949505765E-2"/>
+                  <c:y val="3.8064158788085084E-2"/>
+                </c:manualLayout>
+              </c:layout>
+              <c:showLegendKey val="0"/>
+              <c:showVal val="1"/>
+              <c:showCatName val="1"/>
+              <c:showSerName val="0"/>
+              <c:showPercent val="0"/>
+              <c:showBubbleSize val="0"/>
+              <c:extLst>
+                <c:ext xmlns:c15="http://schemas.microsoft.com/office/drawing/2012/chart" uri="{CE6537A1-D6FC-4f65-9D91-7224C49458BB}"/>
+                <c:ext xmlns:c16="http://schemas.microsoft.com/office/drawing/2014/chart" uri="{C3380CC4-5D6E-409C-BE32-E72D297353CC}">
+                  <c16:uniqueId val="{0000000A-3D14-443F-B42A-929466DA80F6}"/>
+                </c:ext>
+              </c:extLst>
+            </c:dLbl>
+            <c:dLbl>
+              <c:idx val="5"/>
+              <c:layout>
+                <c:manualLayout>
+                  <c:x val="-0.17701522512592213"/>
+                  <c:y val="-9.5621302049576154E-2"/>
+                </c:manualLayout>
+              </c:layout>
+              <c:showLegendKey val="0"/>
+              <c:showVal val="1"/>
+              <c:showCatName val="1"/>
+              <c:showSerName val="0"/>
+              <c:showPercent val="0"/>
+              <c:showBubbleSize val="0"/>
+              <c:extLst>
+                <c:ext xmlns:c15="http://schemas.microsoft.com/office/drawing/2012/chart" uri="{CE6537A1-D6FC-4f65-9D91-7224C49458BB}"/>
+                <c:ext xmlns:c16="http://schemas.microsoft.com/office/drawing/2014/chart" uri="{C3380CC4-5D6E-409C-BE32-E72D297353CC}">
+                  <c16:uniqueId val="{0000000B-3D14-443F-B42A-929466DA80F6}"/>
+                </c:ext>
+              </c:extLst>
+            </c:dLbl>
+            <c:dLbl>
+              <c:idx val="6"/>
+              <c:layout>
+                <c:manualLayout>
+                  <c:x val="5.6665515508948841E-3"/>
+                  <c:y val="4.5676990545702165E-2"/>
+                </c:manualLayout>
+              </c:layout>
+              <c:showLegendKey val="0"/>
+              <c:showVal val="1"/>
+              <c:showCatName val="1"/>
+              <c:showSerName val="0"/>
+              <c:showPercent val="0"/>
+              <c:showBubbleSize val="0"/>
+              <c:extLst>
+                <c:ext xmlns:c15="http://schemas.microsoft.com/office/drawing/2012/chart" uri="{CE6537A1-D6FC-4f65-9D91-7224C49458BB}"/>
+                <c:ext xmlns:c16="http://schemas.microsoft.com/office/drawing/2014/chart" uri="{C3380CC4-5D6E-409C-BE32-E72D297353CC}">
+                  <c16:uniqueId val="{0000000C-3D14-443F-B42A-929466DA80F6}"/>
+                </c:ext>
+              </c:extLst>
+            </c:dLbl>
+            <c:dLbl>
+              <c:idx val="7"/>
+              <c:layout>
+                <c:manualLayout>
+                  <c:x val="-6.0319386790599165E-2"/>
+                  <c:y val="8.808854680946232E-2"/>
+                </c:manualLayout>
+              </c:layout>
+              <c:showLegendKey val="0"/>
+              <c:showVal val="1"/>
+              <c:showCatName val="1"/>
+              <c:showSerName val="0"/>
+              <c:showPercent val="0"/>
+              <c:showBubbleSize val="0"/>
+              <c:extLst>
+                <c:ext xmlns:c15="http://schemas.microsoft.com/office/drawing/2012/chart" uri="{CE6537A1-D6FC-4f65-9D91-7224C49458BB}"/>
+                <c:ext xmlns:c16="http://schemas.microsoft.com/office/drawing/2014/chart" uri="{C3380CC4-5D6E-409C-BE32-E72D297353CC}">
+                  <c16:uniqueId val="{0000000D-3D14-443F-B42A-929466DA80F6}"/>
+                </c:ext>
+              </c:extLst>
+            </c:dLbl>
+            <c:dLbl>
+              <c:idx val="8"/>
+              <c:layout>
+                <c:manualLayout>
+                  <c:x val="-0.10720152888690332"/>
+                  <c:y val="-3.411752791351242E-2"/>
+                </c:manualLayout>
+              </c:layout>
+              <c:showLegendKey val="0"/>
+              <c:showVal val="1"/>
+              <c:showCatName val="1"/>
+              <c:showSerName val="0"/>
+              <c:showPercent val="0"/>
+              <c:showBubbleSize val="0"/>
+              <c:extLst>
+                <c:ext xmlns:c15="http://schemas.microsoft.com/office/drawing/2012/chart" uri="{CE6537A1-D6FC-4f65-9D91-7224C49458BB}"/>
+                <c:ext xmlns:c16="http://schemas.microsoft.com/office/drawing/2014/chart" uri="{C3380CC4-5D6E-409C-BE32-E72D297353CC}">
+                  <c16:uniqueId val="{0000000E-3D14-443F-B42A-929466DA80F6}"/>
+                </c:ext>
+              </c:extLst>
+            </c:dLbl>
+            <c:spPr>
+              <a:solidFill>
+                <a:sysClr val="window" lastClr="FFFFFF"/>
+              </a:solidFill>
+              <a:ln>
+                <a:solidFill>
+                  <a:sysClr val="windowText" lastClr="000000">
+                    <a:lumMod val="25000"/>
+                    <a:lumOff val="75000"/>
+                  </a:sysClr>
+                </a:solidFill>
+              </a:ln>
+              <a:effectLst/>
+            </c:spPr>
+            <c:txPr>
+              <a:bodyPr rot="0" spcFirstLastPara="1" vertOverflow="clip" horzOverflow="clip" vert="horz" wrap="square" lIns="36576" tIns="18288" rIns="36576" bIns="18288" anchor="ctr" anchorCtr="1">
+                <a:spAutoFit/>
+              </a:bodyPr>
+              <a:lstStyle/>
+              <a:p>
+                <a:pPr>
+                  <a:defRPr sz="1050" b="0" i="0" u="none" strike="noStrike" kern="1200" baseline="0">
+                    <a:solidFill>
+                      <a:schemeClr val="dk1">
+                        <a:lumMod val="65000"/>
+                        <a:lumOff val="35000"/>
+                      </a:schemeClr>
+                    </a:solidFill>
+                    <a:latin typeface="+mn-lt"/>
+                    <a:ea typeface="+mn-ea"/>
+                    <a:cs typeface="+mn-cs"/>
+                  </a:defRPr>
+                </a:pPr>
+                <a:endParaRPr lang="en-US"/>
+              </a:p>
+            </c:txPr>
+            <c:showLegendKey val="0"/>
+            <c:showVal val="1"/>
+            <c:showCatName val="1"/>
+            <c:showSerName val="0"/>
+            <c:showPercent val="0"/>
+            <c:showBubbleSize val="0"/>
+            <c:showLeaderLines val="0"/>
+            <c:extLst>
+              <c:ext xmlns:c15="http://schemas.microsoft.com/office/drawing/2012/chart" uri="{CE6537A1-D6FC-4f65-9D91-7224C49458BB}">
+                <c15:spPr xmlns:c15="http://schemas.microsoft.com/office/drawing/2012/chart">
+                  <a:prstGeom prst="wedgeRectCallout">
+                    <a:avLst/>
+                  </a:prstGeom>
+                  <a:noFill/>
+                  <a:ln>
+                    <a:noFill/>
+                  </a:ln>
+                </c15:spPr>
+                <c15:showLeaderLines val="0"/>
+              </c:ext>
+            </c:extLst>
+          </c:dLbls>
+          <c:cat>
+            <c:strRef>
+              <c:f>Sheet1!$A$2:$A$11</c:f>
+              <c:strCache>
+                <c:ptCount val="10"/>
+                <c:pt idx="0">
+                  <c:v>LinearReg Normalized</c:v>
+                </c:pt>
+                <c:pt idx="1">
+                  <c:v>Lasso - Normalized - Alpha = 10000</c:v>
+                </c:pt>
+                <c:pt idx="2">
+                  <c:v>Ridge - Normalized - Alpha = 0.0001</c:v>
+                </c:pt>
+                <c:pt idx="3">
+                  <c:v>Lasso - Alpha = 1000</c:v>
+                </c:pt>
+                <c:pt idx="4">
+                  <c:v>Ridge - Alpha = 0.0001</c:v>
+                </c:pt>
+                <c:pt idx="5">
+                  <c:v>Ridge - Normalized - Alpha = 10000</c:v>
+                </c:pt>
+                <c:pt idx="6">
+                  <c:v>LinearReg</c:v>
+                </c:pt>
+                <c:pt idx="7">
+                  <c:v>Ridge - Alpha = 10000</c:v>
+                </c:pt>
+                <c:pt idx="8">
+                  <c:v>Lasso - Alpha = 0.0001</c:v>
+                </c:pt>
+                <c:pt idx="9">
+                  <c:v>Lasso - Normalized - Alpha = 0.001</c:v>
+                </c:pt>
+              </c:strCache>
+            </c:strRef>
+          </c:cat>
+          <c:val>
+            <c:numRef>
+              <c:f>Sheet1!$C$2:$C$11</c:f>
+              <c:numCache>
+                <c:formatCode>General</c:formatCode>
+                <c:ptCount val="10"/>
+                <c:pt idx="0">
+                  <c:v>9.6189839999999993</c:v>
+                </c:pt>
+                <c:pt idx="1">
+                  <c:v>8.1088389999999997</c:v>
+                </c:pt>
+                <c:pt idx="3">
+                  <c:v>8.1088389999999997</c:v>
+                </c:pt>
+                <c:pt idx="5">
+                  <c:v>8.1110260000000007</c:v>
+                </c:pt>
+                <c:pt idx="6">
+                  <c:v>10.111103</c:v>
+                </c:pt>
+                <c:pt idx="7">
+                  <c:v>8.4627009999999991</c:v>
+                </c:pt>
+                <c:pt idx="8">
+                  <c:v>10.614017</c:v>
+                </c:pt>
+              </c:numCache>
+            </c:numRef>
+          </c:val>
+          <c:smooth val="0"/>
+          <c:extLst>
+            <c:ext xmlns:c16="http://schemas.microsoft.com/office/drawing/2014/chart" uri="{C3380CC4-5D6E-409C-BE32-E72D297353CC}">
+              <c16:uniqueId val="{0000000F-3D14-443F-B42A-929466DA80F6}"/>
+            </c:ext>
+          </c:extLst>
+        </c:ser>
+        <c:dLbls>
+          <c:showLegendKey val="0"/>
+          <c:showVal val="0"/>
+          <c:showCatName val="0"/>
+          <c:showSerName val="0"/>
+          <c:showPercent val="0"/>
+          <c:showBubbleSize val="0"/>
+        </c:dLbls>
+        <c:marker val="1"/>
+        <c:smooth val="0"/>
+        <c:axId val="585007920"/>
+        <c:axId val="585007264"/>
+      </c:lineChart>
+      <c:catAx>
+        <c:axId val="585007920"/>
+        <c:scaling>
+          <c:orientation val="minMax"/>
+        </c:scaling>
+        <c:delete val="0"/>
+        <c:axPos val="b"/>
+        <c:numFmt formatCode="General" sourceLinked="1"/>
+        <c:majorTickMark val="none"/>
+        <c:minorTickMark val="none"/>
+        <c:tickLblPos val="none"/>
+        <c:spPr>
+          <a:noFill/>
+          <a:ln w="9525" cap="flat" cmpd="sng" algn="ctr">
+            <a:solidFill>
+              <a:schemeClr val="tx1">
+                <a:lumMod val="15000"/>
+                <a:lumOff val="85000"/>
+              </a:schemeClr>
+            </a:solidFill>
+            <a:round/>
+          </a:ln>
+          <a:effectLst/>
+        </c:spPr>
+        <c:txPr>
+          <a:bodyPr rot="-60000000" spcFirstLastPara="1" vertOverflow="ellipsis" vert="horz" wrap="square" anchor="ctr" anchorCtr="1"/>
+          <a:lstStyle/>
+          <a:p>
+            <a:pPr>
+              <a:defRPr sz="1050" b="0" i="0" u="none" strike="noStrike" kern="1200" baseline="0">
+                <a:solidFill>
+                  <a:schemeClr val="tx1">
+                    <a:lumMod val="65000"/>
+                    <a:lumOff val="35000"/>
+                  </a:schemeClr>
+                </a:solidFill>
+                <a:latin typeface="+mn-lt"/>
+                <a:ea typeface="+mn-ea"/>
+                <a:cs typeface="+mn-cs"/>
+              </a:defRPr>
+            </a:pPr>
+            <a:endParaRPr lang="en-US"/>
+          </a:p>
+        </c:txPr>
+        <c:crossAx val="585007264"/>
+        <c:crosses val="autoZero"/>
+        <c:auto val="1"/>
+        <c:lblAlgn val="ctr"/>
+        <c:lblOffset val="100"/>
+        <c:noMultiLvlLbl val="0"/>
+      </c:catAx>
+      <c:valAx>
+        <c:axId val="585007264"/>
+        <c:scaling>
+          <c:orientation val="minMax"/>
+          <c:max val="11"/>
+          <c:min val="4"/>
+        </c:scaling>
+        <c:delete val="0"/>
+        <c:axPos val="l"/>
+        <c:majorGridlines>
+          <c:spPr>
+            <a:ln w="9525" cap="flat" cmpd="sng" algn="ctr">
+              <a:solidFill>
+                <a:schemeClr val="tx1">
+                  <a:lumMod val="15000"/>
+                  <a:lumOff val="85000"/>
+                </a:schemeClr>
+              </a:solidFill>
+              <a:round/>
+            </a:ln>
+            <a:effectLst/>
+          </c:spPr>
+        </c:majorGridlines>
+        <c:numFmt formatCode="General" sourceLinked="1"/>
+        <c:majorTickMark val="none"/>
+        <c:minorTickMark val="none"/>
+        <c:tickLblPos val="nextTo"/>
+        <c:spPr>
+          <a:noFill/>
+          <a:ln>
+            <a:noFill/>
+          </a:ln>
+          <a:effectLst/>
+        </c:spPr>
+        <c:txPr>
+          <a:bodyPr rot="-60000000" spcFirstLastPara="1" vertOverflow="ellipsis" vert="horz" wrap="square" anchor="ctr" anchorCtr="1"/>
+          <a:lstStyle/>
+          <a:p>
+            <a:pPr>
+              <a:defRPr sz="1050" b="0" i="0" u="none" strike="noStrike" kern="1200" baseline="0">
+                <a:solidFill>
+                  <a:schemeClr val="tx1">
+                    <a:lumMod val="65000"/>
+                    <a:lumOff val="35000"/>
+                  </a:schemeClr>
+                </a:solidFill>
+                <a:latin typeface="+mn-lt"/>
+                <a:ea typeface="+mn-ea"/>
+                <a:cs typeface="+mn-cs"/>
+              </a:defRPr>
+            </a:pPr>
+            <a:endParaRPr lang="en-US"/>
+          </a:p>
+        </c:txPr>
+        <c:crossAx val="585007920"/>
+        <c:crosses val="autoZero"/>
+        <c:crossBetween val="between"/>
+      </c:valAx>
+      <c:spPr>
+        <a:noFill/>
+        <a:ln>
+          <a:noFill/>
+        </a:ln>
+        <a:effectLst/>
+      </c:spPr>
+    </c:plotArea>
+    <c:legend>
+      <c:legendPos val="b"/>
+      <c:layout>
+        <c:manualLayout>
+          <c:xMode val="edge"/>
+          <c:yMode val="edge"/>
+          <c:x val="8.3149277444469788E-2"/>
+          <c:y val="0.88706238011328398"/>
+          <c:w val="0.835789590514185"/>
+          <c:h val="8.5811902620153716E-2"/>
+        </c:manualLayout>
+      </c:layout>
+      <c:overlay val="0"/>
+      <c:spPr>
+        <a:noFill/>
+        <a:ln>
+          <a:noFill/>
+        </a:ln>
+        <a:effectLst/>
+      </c:spPr>
+      <c:txPr>
+        <a:bodyPr rot="0" spcFirstLastPara="1" vertOverflow="ellipsis" vert="horz" wrap="square" anchor="ctr" anchorCtr="1"/>
+        <a:lstStyle/>
+        <a:p>
+          <a:pPr>
+            <a:defRPr sz="1050" b="0" i="0" u="none" strike="noStrike" kern="1200" baseline="0">
+              <a:solidFill>
+                <a:schemeClr val="tx1">
+                  <a:lumMod val="65000"/>
+                  <a:lumOff val="35000"/>
+                </a:schemeClr>
+              </a:solidFill>
+              <a:latin typeface="+mn-lt"/>
+              <a:ea typeface="+mn-ea"/>
+              <a:cs typeface="+mn-cs"/>
+            </a:defRPr>
+          </a:pPr>
+          <a:endParaRPr lang="en-US"/>
+        </a:p>
+      </c:txPr>
+    </c:legend>
+    <c:plotVisOnly val="1"/>
+    <c:dispBlanksAs val="span"/>
+    <c:extLst>
+      <c:ext xmlns:c16r3="http://schemas.microsoft.com/office/drawing/2017/03/chart" uri="{56B9EC1D-385E-4148-901F-78D8002777C0}">
+        <c16r3:dataDisplayOptions16>
+          <c16r3:dispNaAsBlank val="1"/>
+        </c16r3:dataDisplayOptions16>
+      </c:ext>
+    </c:extLst>
+    <c:showDLblsOverMax val="0"/>
+  </c:chart>
+  <c:spPr>
+    <a:noFill/>
+    <a:ln>
+      <a:noFill/>
+    </a:ln>
+    <a:effectLst/>
+  </c:spPr>
+  <c:txPr>
+    <a:bodyPr/>
+    <a:lstStyle/>
+    <a:p>
+      <a:pPr>
+        <a:defRPr sz="1050"/>
+      </a:pPr>
+      <a:endParaRPr lang="en-US"/>
+    </a:p>
+  </c:txPr>
+  <c:externalData r:id="rId3">
+    <c:autoUpdate val="0"/>
+  </c:externalData>
+</c:chartSpace>
+</file>
+
 <file path=ppt/charts/colors1.xml><?xml version="1.0" encoding="utf-8"?>
 <cs:colorStyle xmlns:cs="http://schemas.microsoft.com/office/drawing/2012/chartStyle" xmlns:a="http://schemas.openxmlformats.org/drawingml/2006/main" meth="cycle" id="10">
   <a:schemeClr val="accent1"/>
@@ -1752,6 +2677,46 @@
 </file>
 
 <file path=ppt/charts/colors3.xml><?xml version="1.0" encoding="utf-8"?>
+<cs:colorStyle xmlns:cs="http://schemas.microsoft.com/office/drawing/2012/chartStyle" xmlns:a="http://schemas.openxmlformats.org/drawingml/2006/main" meth="cycle" id="10">
+  <a:schemeClr val="accent1"/>
+  <a:schemeClr val="accent2"/>
+  <a:schemeClr val="accent3"/>
+  <a:schemeClr val="accent4"/>
+  <a:schemeClr val="accent5"/>
+  <a:schemeClr val="accent6"/>
+  <cs:variation/>
+  <cs:variation>
+    <a:lumMod val="60000"/>
+  </cs:variation>
+  <cs:variation>
+    <a:lumMod val="80000"/>
+    <a:lumOff val="20000"/>
+  </cs:variation>
+  <cs:variation>
+    <a:lumMod val="80000"/>
+  </cs:variation>
+  <cs:variation>
+    <a:lumMod val="60000"/>
+    <a:lumOff val="40000"/>
+  </cs:variation>
+  <cs:variation>
+    <a:lumMod val="50000"/>
+  </cs:variation>
+  <cs:variation>
+    <a:lumMod val="70000"/>
+    <a:lumOff val="30000"/>
+  </cs:variation>
+  <cs:variation>
+    <a:lumMod val="70000"/>
+  </cs:variation>
+  <cs:variation>
+    <a:lumMod val="50000"/>
+    <a:lumOff val="50000"/>
+  </cs:variation>
+</cs:colorStyle>
+</file>
+
+<file path=ppt/charts/colors4.xml><?xml version="1.0" encoding="utf-8"?>
 <cs:colorStyle xmlns:cs="http://schemas.microsoft.com/office/drawing/2012/chartStyle" xmlns:a="http://schemas.openxmlformats.org/drawingml/2006/main" meth="cycle" id="10">
   <a:schemeClr val="accent1"/>
   <a:schemeClr val="accent2"/>
@@ -3282,6 +4247,509 @@
       </a:schemeClr>
     </cs:fontRef>
     <cs:defRPr sz="1197" kern="1200"/>
+  </cs:valueAxis>
+  <cs:wall>
+    <cs:lnRef idx="0"/>
+    <cs:fillRef idx="0"/>
+    <cs:effectRef idx="0"/>
+    <cs:fontRef idx="minor">
+      <a:schemeClr val="tx1"/>
+    </cs:fontRef>
+    <cs:spPr>
+      <a:noFill/>
+      <a:ln>
+        <a:noFill/>
+      </a:ln>
+    </cs:spPr>
+  </cs:wall>
+</cs:chartStyle>
+</file>
+
+<file path=ppt/charts/style4.xml><?xml version="1.0" encoding="utf-8"?>
+<cs:chartStyle xmlns:cs="http://schemas.microsoft.com/office/drawing/2012/chartStyle" xmlns:a="http://schemas.openxmlformats.org/drawingml/2006/main" id="332">
+  <cs:axisTitle>
+    <cs:lnRef idx="0"/>
+    <cs:fillRef idx="0"/>
+    <cs:effectRef idx="0"/>
+    <cs:fontRef idx="minor">
+      <a:schemeClr val="tx1">
+        <a:lumMod val="65000"/>
+        <a:lumOff val="35000"/>
+      </a:schemeClr>
+    </cs:fontRef>
+    <cs:defRPr sz="1000" kern="1200"/>
+  </cs:axisTitle>
+  <cs:categoryAxis>
+    <cs:lnRef idx="0"/>
+    <cs:fillRef idx="0"/>
+    <cs:effectRef idx="0"/>
+    <cs:fontRef idx="minor">
+      <a:schemeClr val="tx1">
+        <a:lumMod val="65000"/>
+        <a:lumOff val="35000"/>
+      </a:schemeClr>
+    </cs:fontRef>
+    <cs:spPr>
+      <a:ln w="9525" cap="flat" cmpd="sng" algn="ctr">
+        <a:solidFill>
+          <a:schemeClr val="tx1">
+            <a:lumMod val="15000"/>
+            <a:lumOff val="85000"/>
+          </a:schemeClr>
+        </a:solidFill>
+        <a:round/>
+      </a:ln>
+    </cs:spPr>
+    <cs:defRPr sz="900" kern="1200"/>
+  </cs:categoryAxis>
+  <cs:chartArea mods="allowNoFillOverride allowNoLineOverride">
+    <cs:lnRef idx="0"/>
+    <cs:fillRef idx="0"/>
+    <cs:effectRef idx="0"/>
+    <cs:fontRef idx="minor">
+      <a:schemeClr val="tx1"/>
+    </cs:fontRef>
+    <cs:spPr>
+      <a:solidFill>
+        <a:schemeClr val="bg1"/>
+      </a:solidFill>
+      <a:ln w="9525" cap="flat" cmpd="sng" algn="ctr">
+        <a:solidFill>
+          <a:schemeClr val="tx1">
+            <a:lumMod val="15000"/>
+            <a:lumOff val="85000"/>
+          </a:schemeClr>
+        </a:solidFill>
+        <a:round/>
+      </a:ln>
+    </cs:spPr>
+    <cs:defRPr sz="1000" kern="1200"/>
+  </cs:chartArea>
+  <cs:dataLabel>
+    <cs:lnRef idx="0"/>
+    <cs:fillRef idx="0"/>
+    <cs:effectRef idx="0"/>
+    <cs:fontRef idx="minor">
+      <a:schemeClr val="tx1">
+        <a:lumMod val="75000"/>
+        <a:lumOff val="25000"/>
+      </a:schemeClr>
+    </cs:fontRef>
+    <cs:defRPr sz="900" kern="1200"/>
+  </cs:dataLabel>
+  <cs:dataLabelCallout>
+    <cs:lnRef idx="0"/>
+    <cs:fillRef idx="0"/>
+    <cs:effectRef idx="0"/>
+    <cs:fontRef idx="minor">
+      <a:schemeClr val="dk1">
+        <a:lumMod val="65000"/>
+        <a:lumOff val="35000"/>
+      </a:schemeClr>
+    </cs:fontRef>
+    <cs:spPr>
+      <a:solidFill>
+        <a:schemeClr val="lt1"/>
+      </a:solidFill>
+      <a:ln>
+        <a:solidFill>
+          <a:schemeClr val="dk1">
+            <a:lumMod val="25000"/>
+            <a:lumOff val="75000"/>
+          </a:schemeClr>
+        </a:solidFill>
+      </a:ln>
+    </cs:spPr>
+    <cs:defRPr sz="900" kern="1200"/>
+    <cs:bodyPr rot="0" spcFirstLastPara="1" vertOverflow="clip" horzOverflow="clip" vert="horz" wrap="square" lIns="36576" tIns="18288" rIns="36576" bIns="18288" anchor="ctr" anchorCtr="1">
+      <a:spAutoFit/>
+    </cs:bodyPr>
+  </cs:dataLabelCallout>
+  <cs:dataPoint>
+    <cs:lnRef idx="0"/>
+    <cs:fillRef idx="1">
+      <cs:styleClr val="auto"/>
+    </cs:fillRef>
+    <cs:effectRef idx="0"/>
+    <cs:fontRef idx="minor">
+      <a:schemeClr val="tx1"/>
+    </cs:fontRef>
+  </cs:dataPoint>
+  <cs:dataPoint3D>
+    <cs:lnRef idx="0"/>
+    <cs:fillRef idx="1">
+      <cs:styleClr val="auto"/>
+    </cs:fillRef>
+    <cs:effectRef idx="0"/>
+    <cs:fontRef idx="minor">
+      <a:schemeClr val="tx1"/>
+    </cs:fontRef>
+  </cs:dataPoint3D>
+  <cs:dataPointLine>
+    <cs:lnRef idx="0">
+      <cs:styleClr val="auto"/>
+    </cs:lnRef>
+    <cs:fillRef idx="1"/>
+    <cs:effectRef idx="0"/>
+    <cs:fontRef idx="minor">
+      <a:schemeClr val="tx1"/>
+    </cs:fontRef>
+    <cs:spPr>
+      <a:ln w="28575" cap="rnd">
+        <a:solidFill>
+          <a:schemeClr val="phClr"/>
+        </a:solidFill>
+        <a:round/>
+      </a:ln>
+    </cs:spPr>
+  </cs:dataPointLine>
+  <cs:dataPointMarker>
+    <cs:lnRef idx="0">
+      <cs:styleClr val="auto"/>
+    </cs:lnRef>
+    <cs:fillRef idx="1">
+      <cs:styleClr val="auto"/>
+    </cs:fillRef>
+    <cs:effectRef idx="0"/>
+    <cs:fontRef idx="minor">
+      <a:schemeClr val="tx1"/>
+    </cs:fontRef>
+    <cs:spPr>
+      <a:ln w="9525">
+        <a:solidFill>
+          <a:schemeClr val="phClr"/>
+        </a:solidFill>
+      </a:ln>
+    </cs:spPr>
+  </cs:dataPointMarker>
+  <cs:dataPointMarkerLayout symbol="circle" size="5"/>
+  <cs:dataPointWireframe>
+    <cs:lnRef idx="0">
+      <cs:styleClr val="auto"/>
+    </cs:lnRef>
+    <cs:fillRef idx="1"/>
+    <cs:effectRef idx="0"/>
+    <cs:fontRef idx="minor">
+      <a:schemeClr val="tx1"/>
+    </cs:fontRef>
+    <cs:spPr>
+      <a:ln w="9525" cap="rnd">
+        <a:solidFill>
+          <a:schemeClr val="phClr"/>
+        </a:solidFill>
+        <a:round/>
+      </a:ln>
+    </cs:spPr>
+  </cs:dataPointWireframe>
+  <cs:dataTable>
+    <cs:lnRef idx="0"/>
+    <cs:fillRef idx="0"/>
+    <cs:effectRef idx="0"/>
+    <cs:fontRef idx="minor">
+      <a:schemeClr val="tx1">
+        <a:lumMod val="65000"/>
+        <a:lumOff val="35000"/>
+      </a:schemeClr>
+    </cs:fontRef>
+    <cs:spPr>
+      <a:noFill/>
+      <a:ln w="9525" cap="flat" cmpd="sng" algn="ctr">
+        <a:solidFill>
+          <a:schemeClr val="tx1">
+            <a:lumMod val="15000"/>
+            <a:lumOff val="85000"/>
+          </a:schemeClr>
+        </a:solidFill>
+        <a:round/>
+      </a:ln>
+    </cs:spPr>
+    <cs:defRPr sz="900" kern="1200"/>
+  </cs:dataTable>
+  <cs:downBar>
+    <cs:lnRef idx="0"/>
+    <cs:fillRef idx="0"/>
+    <cs:effectRef idx="0"/>
+    <cs:fontRef idx="minor">
+      <a:schemeClr val="dk1"/>
+    </cs:fontRef>
+    <cs:spPr>
+      <a:solidFill>
+        <a:schemeClr val="dk1">
+          <a:lumMod val="65000"/>
+          <a:lumOff val="35000"/>
+        </a:schemeClr>
+      </a:solidFill>
+      <a:ln w="9525">
+        <a:solidFill>
+          <a:schemeClr val="tx1">
+            <a:lumMod val="65000"/>
+            <a:lumOff val="35000"/>
+          </a:schemeClr>
+        </a:solidFill>
+      </a:ln>
+    </cs:spPr>
+  </cs:downBar>
+  <cs:dropLine>
+    <cs:lnRef idx="0"/>
+    <cs:fillRef idx="0"/>
+    <cs:effectRef idx="0"/>
+    <cs:fontRef idx="minor">
+      <a:schemeClr val="tx1"/>
+    </cs:fontRef>
+    <cs:spPr>
+      <a:ln w="9525" cap="flat" cmpd="sng" algn="ctr">
+        <a:solidFill>
+          <a:schemeClr val="tx1">
+            <a:lumMod val="35000"/>
+            <a:lumOff val="65000"/>
+          </a:schemeClr>
+        </a:solidFill>
+        <a:round/>
+      </a:ln>
+    </cs:spPr>
+  </cs:dropLine>
+  <cs:errorBar>
+    <cs:lnRef idx="0"/>
+    <cs:fillRef idx="0"/>
+    <cs:effectRef idx="0"/>
+    <cs:fontRef idx="minor">
+      <a:schemeClr val="tx1"/>
+    </cs:fontRef>
+    <cs:spPr>
+      <a:ln w="9525" cap="flat" cmpd="sng" algn="ctr">
+        <a:solidFill>
+          <a:schemeClr val="tx1">
+            <a:lumMod val="65000"/>
+            <a:lumOff val="35000"/>
+          </a:schemeClr>
+        </a:solidFill>
+        <a:round/>
+      </a:ln>
+    </cs:spPr>
+  </cs:errorBar>
+  <cs:floor>
+    <cs:lnRef idx="0"/>
+    <cs:fillRef idx="0"/>
+    <cs:effectRef idx="0"/>
+    <cs:fontRef idx="minor">
+      <a:schemeClr val="tx1"/>
+    </cs:fontRef>
+    <cs:spPr>
+      <a:noFill/>
+      <a:ln>
+        <a:noFill/>
+      </a:ln>
+    </cs:spPr>
+  </cs:floor>
+  <cs:gridlineMajor>
+    <cs:lnRef idx="0"/>
+    <cs:fillRef idx="0"/>
+    <cs:effectRef idx="0"/>
+    <cs:fontRef idx="minor">
+      <a:schemeClr val="tx1"/>
+    </cs:fontRef>
+    <cs:spPr>
+      <a:ln w="9525" cap="flat" cmpd="sng" algn="ctr">
+        <a:solidFill>
+          <a:schemeClr val="tx1">
+            <a:lumMod val="15000"/>
+            <a:lumOff val="85000"/>
+          </a:schemeClr>
+        </a:solidFill>
+        <a:round/>
+      </a:ln>
+    </cs:spPr>
+  </cs:gridlineMajor>
+  <cs:gridlineMinor>
+    <cs:lnRef idx="0"/>
+    <cs:fillRef idx="0"/>
+    <cs:effectRef idx="0"/>
+    <cs:fontRef idx="minor">
+      <a:schemeClr val="tx1"/>
+    </cs:fontRef>
+    <cs:spPr>
+      <a:ln w="9525" cap="flat" cmpd="sng" algn="ctr">
+        <a:solidFill>
+          <a:schemeClr val="tx1">
+            <a:lumMod val="5000"/>
+            <a:lumOff val="95000"/>
+          </a:schemeClr>
+        </a:solidFill>
+        <a:round/>
+      </a:ln>
+    </cs:spPr>
+  </cs:gridlineMinor>
+  <cs:hiLoLine>
+    <cs:lnRef idx="0"/>
+    <cs:fillRef idx="0"/>
+    <cs:effectRef idx="0"/>
+    <cs:fontRef idx="minor">
+      <a:schemeClr val="tx1"/>
+    </cs:fontRef>
+    <cs:spPr>
+      <a:ln w="9525" cap="flat" cmpd="sng" algn="ctr">
+        <a:solidFill>
+          <a:schemeClr val="tx1">
+            <a:lumMod val="75000"/>
+            <a:lumOff val="25000"/>
+          </a:schemeClr>
+        </a:solidFill>
+        <a:round/>
+      </a:ln>
+    </cs:spPr>
+  </cs:hiLoLine>
+  <cs:leaderLine>
+    <cs:lnRef idx="0"/>
+    <cs:fillRef idx="0"/>
+    <cs:effectRef idx="0"/>
+    <cs:fontRef idx="minor">
+      <a:schemeClr val="tx1"/>
+    </cs:fontRef>
+    <cs:spPr>
+      <a:ln w="9525" cap="flat" cmpd="sng" algn="ctr">
+        <a:solidFill>
+          <a:schemeClr val="tx1">
+            <a:lumMod val="35000"/>
+            <a:lumOff val="65000"/>
+          </a:schemeClr>
+        </a:solidFill>
+        <a:round/>
+      </a:ln>
+    </cs:spPr>
+  </cs:leaderLine>
+  <cs:legend>
+    <cs:lnRef idx="0"/>
+    <cs:fillRef idx="0"/>
+    <cs:effectRef idx="0"/>
+    <cs:fontRef idx="minor">
+      <a:schemeClr val="tx1">
+        <a:lumMod val="65000"/>
+        <a:lumOff val="35000"/>
+      </a:schemeClr>
+    </cs:fontRef>
+    <cs:defRPr sz="900" kern="1200"/>
+  </cs:legend>
+  <cs:plotArea mods="allowNoFillOverride allowNoLineOverride">
+    <cs:lnRef idx="0"/>
+    <cs:fillRef idx="0"/>
+    <cs:effectRef idx="0"/>
+    <cs:fontRef idx="minor">
+      <a:schemeClr val="tx1"/>
+    </cs:fontRef>
+  </cs:plotArea>
+  <cs:plotArea3D mods="allowNoFillOverride allowNoLineOverride">
+    <cs:lnRef idx="0"/>
+    <cs:fillRef idx="0"/>
+    <cs:effectRef idx="0"/>
+    <cs:fontRef idx="minor">
+      <a:schemeClr val="tx1"/>
+    </cs:fontRef>
+  </cs:plotArea3D>
+  <cs:seriesAxis>
+    <cs:lnRef idx="0"/>
+    <cs:fillRef idx="0"/>
+    <cs:effectRef idx="0"/>
+    <cs:fontRef idx="minor">
+      <a:schemeClr val="tx1">
+        <a:lumMod val="65000"/>
+        <a:lumOff val="35000"/>
+      </a:schemeClr>
+    </cs:fontRef>
+    <cs:defRPr sz="900" kern="1200"/>
+  </cs:seriesAxis>
+  <cs:seriesLine>
+    <cs:lnRef idx="0"/>
+    <cs:fillRef idx="0"/>
+    <cs:effectRef idx="0"/>
+    <cs:fontRef idx="minor">
+      <a:schemeClr val="tx1"/>
+    </cs:fontRef>
+    <cs:spPr>
+      <a:ln w="9525" cap="flat" cmpd="sng" algn="ctr">
+        <a:solidFill>
+          <a:schemeClr val="tx1">
+            <a:lumMod val="35000"/>
+            <a:lumOff val="65000"/>
+          </a:schemeClr>
+        </a:solidFill>
+        <a:round/>
+      </a:ln>
+    </cs:spPr>
+  </cs:seriesLine>
+  <cs:title>
+    <cs:lnRef idx="0"/>
+    <cs:fillRef idx="0"/>
+    <cs:effectRef idx="0"/>
+    <cs:fontRef idx="minor">
+      <a:schemeClr val="tx1">
+        <a:lumMod val="65000"/>
+        <a:lumOff val="35000"/>
+      </a:schemeClr>
+    </cs:fontRef>
+    <cs:defRPr sz="1400" b="0" kern="1200" spc="0" baseline="0"/>
+  </cs:title>
+  <cs:trendline>
+    <cs:lnRef idx="0">
+      <cs:styleClr val="auto"/>
+    </cs:lnRef>
+    <cs:fillRef idx="0"/>
+    <cs:effectRef idx="0"/>
+    <cs:fontRef idx="minor">
+      <a:schemeClr val="tx1"/>
+    </cs:fontRef>
+    <cs:spPr>
+      <a:ln w="19050" cap="rnd">
+        <a:solidFill>
+          <a:schemeClr val="phClr"/>
+        </a:solidFill>
+        <a:prstDash val="sysDot"/>
+      </a:ln>
+    </cs:spPr>
+  </cs:trendline>
+  <cs:trendlineLabel>
+    <cs:lnRef idx="0"/>
+    <cs:fillRef idx="0"/>
+    <cs:effectRef idx="0"/>
+    <cs:fontRef idx="minor">
+      <a:schemeClr val="tx1">
+        <a:lumMod val="65000"/>
+        <a:lumOff val="35000"/>
+      </a:schemeClr>
+    </cs:fontRef>
+    <cs:defRPr sz="900" kern="1200"/>
+  </cs:trendlineLabel>
+  <cs:upBar>
+    <cs:lnRef idx="0"/>
+    <cs:fillRef idx="0"/>
+    <cs:effectRef idx="0"/>
+    <cs:fontRef idx="minor">
+      <a:schemeClr val="dk1"/>
+    </cs:fontRef>
+    <cs:spPr>
+      <a:solidFill>
+        <a:schemeClr val="lt1"/>
+      </a:solidFill>
+      <a:ln w="9525">
+        <a:solidFill>
+          <a:schemeClr val="tx1">
+            <a:lumMod val="15000"/>
+            <a:lumOff val="85000"/>
+          </a:schemeClr>
+        </a:solidFill>
+      </a:ln>
+    </cs:spPr>
+  </cs:upBar>
+  <cs:valueAxis>
+    <cs:lnRef idx="0"/>
+    <cs:fillRef idx="0"/>
+    <cs:effectRef idx="0"/>
+    <cs:fontRef idx="minor">
+      <a:schemeClr val="tx1">
+        <a:lumMod val="65000"/>
+        <a:lumOff val="35000"/>
+      </a:schemeClr>
+    </cs:fontRef>
+    <cs:defRPr sz="900" kern="1200"/>
   </cs:valueAxis>
   <cs:wall>
     <cs:lnRef idx="0"/>
@@ -5782,7 +7250,7 @@
           <a:p>
             <a:fld id="{75CB0146-FD51-4485-B071-3D1562789090}" type="datetimeFigureOut">
               <a:rPr lang="en-US" smtClean="0"/>
-              <a:t>6/1/2021</a:t>
+              <a:t>6/3/2021</a:t>
             </a:fld>
             <a:endParaRPr lang="en-US"/>
           </a:p>
@@ -6636,7 +8104,7 @@
             <a:fld id="{8256C2ED-54A4-480D-B5C8-65C0D62359B9}" type="datetime2">
               <a:rPr lang="en-US" smtClean="0"/>
               <a:pPr/>
-              <a:t>Tuesday, June 1, 2021</a:t>
+              <a:t>Thursday, June 3, 2021</a:t>
             </a:fld>
             <a:endParaRPr lang="en-US" dirty="0"/>
           </a:p>
@@ -6938,7 +8406,7 @@
             <a:fld id="{8256C2ED-54A4-480D-B5C8-65C0D62359B9}" type="datetime2">
               <a:rPr lang="en-US" smtClean="0"/>
               <a:pPr/>
-              <a:t>Tuesday, June 1, 2021</a:t>
+              <a:t>Thursday, June 3, 2021</a:t>
             </a:fld>
             <a:endParaRPr lang="en-US" dirty="0"/>
           </a:p>
@@ -7193,7 +8661,7 @@
             <a:fld id="{8256C2ED-54A4-480D-B5C8-65C0D62359B9}" type="datetime2">
               <a:rPr lang="en-US" smtClean="0"/>
               <a:pPr/>
-              <a:t>Tuesday, June 1, 2021</a:t>
+              <a:t>Thursday, June 3, 2021</a:t>
             </a:fld>
             <a:endParaRPr lang="en-US" dirty="0"/>
           </a:p>
@@ -7740,7 +9208,7 @@
             <a:fld id="{8256C2ED-54A4-480D-B5C8-65C0D62359B9}" type="datetime2">
               <a:rPr lang="en-US" smtClean="0"/>
               <a:pPr/>
-              <a:t>Tuesday, June 1, 2021</a:t>
+              <a:t>Thursday, June 3, 2021</a:t>
             </a:fld>
             <a:endParaRPr lang="en-US" dirty="0"/>
           </a:p>
@@ -7995,7 +9463,7 @@
             <a:fld id="{8256C2ED-54A4-480D-B5C8-65C0D62359B9}" type="datetime2">
               <a:rPr lang="en-US" smtClean="0"/>
               <a:pPr/>
-              <a:t>Tuesday, June 1, 2021</a:t>
+              <a:t>Thursday, June 3, 2021</a:t>
             </a:fld>
             <a:endParaRPr lang="en-US" dirty="0"/>
           </a:p>
@@ -8534,7 +10002,7 @@
             <a:fld id="{8256C2ED-54A4-480D-B5C8-65C0D62359B9}" type="datetime2">
               <a:rPr lang="en-US" smtClean="0"/>
               <a:pPr/>
-              <a:t>Tuesday, June 1, 2021</a:t>
+              <a:t>Thursday, June 3, 2021</a:t>
             </a:fld>
             <a:endParaRPr lang="en-US" dirty="0"/>
           </a:p>
@@ -8838,7 +10306,7 @@
             <a:fld id="{8256C2ED-54A4-480D-B5C8-65C0D62359B9}" type="datetime2">
               <a:rPr lang="en-US" smtClean="0"/>
               <a:pPr/>
-              <a:t>Tuesday, June 1, 2021</a:t>
+              <a:t>Thursday, June 3, 2021</a:t>
             </a:fld>
             <a:endParaRPr lang="en-US" dirty="0"/>
           </a:p>
@@ -9018,7 +10486,7 @@
           <a:p>
             <a:fld id="{53CF612A-4CB0-4F57-9A87-F049CECB184D}" type="datetime2">
               <a:rPr lang="en-US" smtClean="0"/>
-              <a:t>Tuesday, June 1, 2021</a:t>
+              <a:t>Thursday, June 3, 2021</a:t>
             </a:fld>
             <a:endParaRPr lang="en-US"/>
           </a:p>
@@ -9201,7 +10669,7 @@
           <a:p>
             <a:fld id="{8F397F40-C8F7-4897-A6B8-241042F913A9}" type="datetime2">
               <a:rPr lang="en-US" smtClean="0"/>
-              <a:t>Tuesday, June 1, 2021</a:t>
+              <a:t>Thursday, June 3, 2021</a:t>
             </a:fld>
             <a:endParaRPr lang="en-US"/>
           </a:p>
@@ -9375,7 +10843,7 @@
             <a:fld id="{8256C2ED-54A4-480D-B5C8-65C0D62359B9}" type="datetime2">
               <a:rPr lang="en-US" smtClean="0"/>
               <a:pPr/>
-              <a:t>Tuesday, June 1, 2021</a:t>
+              <a:t>Thursday, June 3, 2021</a:t>
             </a:fld>
             <a:endParaRPr lang="en-US" dirty="0"/>
           </a:p>
@@ -9631,7 +11099,7 @@
           <a:p>
             <a:fld id="{10EDCA73-0A86-4195-A787-75037827079D}" type="datetime2">
               <a:rPr lang="en-US" smtClean="0"/>
-              <a:t>Tuesday, June 1, 2021</a:t>
+              <a:t>Thursday, June 3, 2021</a:t>
             </a:fld>
             <a:endParaRPr lang="en-US"/>
           </a:p>
@@ -9931,7 +11399,7 @@
           <a:p>
             <a:fld id="{83C75374-B296-498E-A935-80631EA9020D}" type="datetime2">
               <a:rPr lang="en-US" smtClean="0"/>
-              <a:t>Tuesday, June 1, 2021</a:t>
+              <a:t>Thursday, June 3, 2021</a:t>
             </a:fld>
             <a:endParaRPr lang="en-US"/>
           </a:p>
@@ -10376,7 +11844,7 @@
           <a:p>
             <a:fld id="{B098B728-214A-4ABC-8432-5B3A5A66A987}" type="datetime2">
               <a:rPr lang="en-US" smtClean="0"/>
-              <a:t>Tuesday, June 1, 2021</a:t>
+              <a:t>Thursday, June 3, 2021</a:t>
             </a:fld>
             <a:endParaRPr lang="en-US" dirty="0"/>
           </a:p>
@@ -10497,7 +11965,7 @@
           <a:p>
             <a:fld id="{015F02D0-6806-43AF-9888-2359BF40C204}" type="datetime2">
               <a:rPr lang="en-US" smtClean="0"/>
-              <a:t>Tuesday, June 1, 2021</a:t>
+              <a:t>Thursday, June 3, 2021</a:t>
             </a:fld>
             <a:endParaRPr lang="en-US"/>
           </a:p>
@@ -10595,7 +12063,7 @@
           <a:p>
             <a:fld id="{8EE14D2D-B1AF-4197-82D6-FC1F8BD05681}" type="datetime2">
               <a:rPr lang="en-US" smtClean="0"/>
-              <a:t>Tuesday, June 1, 2021</a:t>
+              <a:t>Thursday, June 3, 2021</a:t>
             </a:fld>
             <a:endParaRPr lang="en-US"/>
           </a:p>
@@ -10881,7 +12349,7 @@
           <a:p>
             <a:fld id="{98771CEB-9838-4245-91B8-EFBAFE2D8B44}" type="datetime2">
               <a:rPr lang="en-US" smtClean="0"/>
-              <a:t>Tuesday, June 1, 2021</a:t>
+              <a:t>Thursday, June 3, 2021</a:t>
             </a:fld>
             <a:endParaRPr lang="en-US"/>
           </a:p>
@@ -11175,7 +12643,7 @@
           <a:p>
             <a:fld id="{51D3F6BF-A585-41F8-88DF-7E5D069F892A}" type="datetime2">
               <a:rPr lang="en-US" smtClean="0"/>
-              <a:t>Tuesday, June 1, 2021</a:t>
+              <a:t>Thursday, June 3, 2021</a:t>
             </a:fld>
             <a:endParaRPr lang="en-US"/>
           </a:p>
@@ -11709,7 +13177,7 @@
             <a:fld id="{8256C2ED-54A4-480D-B5C8-65C0D62359B9}" type="datetime2">
               <a:rPr lang="en-US" smtClean="0"/>
               <a:pPr/>
-              <a:t>Tuesday, June 1, 2021</a:t>
+              <a:t>Thursday, June 3, 2021</a:t>
             </a:fld>
             <a:endParaRPr lang="en-US" dirty="0"/>
           </a:p>
@@ -13191,10 +14659,10 @@
       </p:sp>
       <p:graphicFrame>
         <p:nvGraphicFramePr>
-          <p:cNvPr id="9" name="Table 9">
+          <p:cNvPr id="14" name="Content Placeholder 13">
             <a:extLst>
               <a:ext uri="{FF2B5EF4-FFF2-40B4-BE49-F238E27FC236}">
-                <a16:creationId xmlns:a16="http://schemas.microsoft.com/office/drawing/2014/main" id="{C331D44D-BA64-459F-9457-1D3BF9B64E0A}"/>
+                <a16:creationId xmlns:a16="http://schemas.microsoft.com/office/drawing/2014/main" id="{B2F64E00-4D21-4928-99AF-DBA423B70A5C}"/>
               </a:ext>
             </a:extLst>
           </p:cNvPr>
@@ -13205,484 +14673,18 @@
             <p:ph idx="1"/>
             <p:extLst>
               <p:ext uri="{D42A27DB-BD31-4B8C-83A1-F6EECF244321}">
-                <p14:modId xmlns:p14="http://schemas.microsoft.com/office/powerpoint/2010/main" val="4096645720"/>
+                <p14:modId xmlns:p14="http://schemas.microsoft.com/office/powerpoint/2010/main" val="2534790605"/>
               </p:ext>
             </p:extLst>
           </p:nvPr>
         </p:nvGraphicFramePr>
         <p:xfrm>
-          <a:off x="1484313" y="2667000"/>
-          <a:ext cx="10018712" cy="3337560"/>
+          <a:off x="835378" y="2032000"/>
+          <a:ext cx="11356622" cy="4312355"/>
         </p:xfrm>
         <a:graphic>
-          <a:graphicData uri="http://schemas.openxmlformats.org/drawingml/2006/table">
-            <a:tbl>
-              <a:tblPr firstRow="1" bandRow="1">
-                <a:tableStyleId>{5C22544A-7EE6-4342-B048-85BDC9FD1C3A}</a:tableStyleId>
-              </a:tblPr>
-              <a:tblGrid>
-                <a:gridCol w="5009356">
-                  <a:extLst>
-                    <a:ext uri="{9D8B030D-6E8A-4147-A177-3AD203B41FA5}">
-                      <a16:colId xmlns:a16="http://schemas.microsoft.com/office/drawing/2014/main" val="379410938"/>
-                    </a:ext>
-                  </a:extLst>
-                </a:gridCol>
-                <a:gridCol w="5009356">
-                  <a:extLst>
-                    <a:ext uri="{9D8B030D-6E8A-4147-A177-3AD203B41FA5}">
-                      <a16:colId xmlns:a16="http://schemas.microsoft.com/office/drawing/2014/main" val="3620682440"/>
-                    </a:ext>
-                  </a:extLst>
-                </a:gridCol>
-              </a:tblGrid>
-              <a:tr h="370840">
-                <a:tc>
-                  <a:txBody>
-                    <a:bodyPr/>
-                    <a:lstStyle/>
-                    <a:p>
-                      <a:r>
-                        <a:rPr lang="en-US">
-                          <a:latin typeface="Calibri" panose="020F0502020204030204" pitchFamily="34" charset="0"/>
-                          <a:cs typeface="Calibri" panose="020F0502020204030204" pitchFamily="34" charset="0"/>
-                        </a:rPr>
-                        <a:t>Model</a:t>
-                      </a:r>
-                    </a:p>
-                  </a:txBody>
-                  <a:tcPr/>
-                </a:tc>
-                <a:tc>
-                  <a:txBody>
-                    <a:bodyPr/>
-                    <a:lstStyle/>
-                    <a:p>
-                      <a:r>
-                        <a:rPr lang="en-US">
-                          <a:latin typeface="Calibri" panose="020F0502020204030204" pitchFamily="34" charset="0"/>
-                          <a:cs typeface="Calibri" panose="020F0502020204030204" pitchFamily="34" charset="0"/>
-                        </a:rPr>
-                        <a:t>Root Mean Square Error</a:t>
-                      </a:r>
-                    </a:p>
-                  </a:txBody>
-                  <a:tcPr/>
-                </a:tc>
-                <a:extLst>
-                  <a:ext uri="{0D108BD9-81ED-4DB2-BD59-A6C34878D82A}">
-                    <a16:rowId xmlns:a16="http://schemas.microsoft.com/office/drawing/2014/main" val="2463943391"/>
-                  </a:ext>
-                </a:extLst>
-              </a:tr>
-              <a:tr h="370840">
-                <a:tc>
-                  <a:txBody>
-                    <a:bodyPr/>
-                    <a:lstStyle/>
-                    <a:p>
-                      <a:r>
-                        <a:rPr lang="en-US">
-                          <a:latin typeface="Calibri" panose="020F0502020204030204" pitchFamily="34" charset="0"/>
-                          <a:cs typeface="Calibri" panose="020F0502020204030204" pitchFamily="34" charset="0"/>
-                        </a:rPr>
-                        <a:t>Linear Regression – default – Normalized Data</a:t>
-                      </a:r>
-                    </a:p>
-                  </a:txBody>
-                  <a:tcPr/>
-                </a:tc>
-                <a:tc>
-                  <a:txBody>
-                    <a:bodyPr/>
-                    <a:lstStyle/>
-                    <a:p>
-                      <a:r>
-                        <a:rPr lang="en-US">
-                          <a:latin typeface="Calibri" panose="020F0502020204030204" pitchFamily="34" charset="0"/>
-                          <a:cs typeface="Calibri" panose="020F0502020204030204" pitchFamily="34" charset="0"/>
-                        </a:rPr>
-                        <a:t>4.230825</a:t>
-                      </a:r>
-                    </a:p>
-                  </a:txBody>
-                  <a:tcPr/>
-                </a:tc>
-                <a:extLst>
-                  <a:ext uri="{0D108BD9-81ED-4DB2-BD59-A6C34878D82A}">
-                    <a16:rowId xmlns:a16="http://schemas.microsoft.com/office/drawing/2014/main" val="3711726048"/>
-                  </a:ext>
-                </a:extLst>
-              </a:tr>
-              <a:tr h="370840">
-                <a:tc>
-                  <a:txBody>
-                    <a:bodyPr/>
-                    <a:lstStyle/>
-                    <a:p>
-                      <a:r>
-                        <a:rPr lang="en-US">
-                          <a:latin typeface="Calibri" panose="020F0502020204030204" pitchFamily="34" charset="0"/>
-                          <a:cs typeface="Calibri" panose="020F0502020204030204" pitchFamily="34" charset="0"/>
-                        </a:rPr>
-                        <a:t>Ridge regression – Normalized – </a:t>
-                      </a:r>
-                      <a:r>
-                        <a:rPr lang="el-GR">
-                          <a:latin typeface="Calibri" panose="020F0502020204030204" pitchFamily="34" charset="0"/>
-                          <a:cs typeface="Calibri" panose="020F0502020204030204" pitchFamily="34" charset="0"/>
-                        </a:rPr>
-                        <a:t>α</a:t>
-                      </a:r>
-                      <a:r>
-                        <a:rPr lang="en-US">
-                          <a:latin typeface="Calibri" panose="020F0502020204030204" pitchFamily="34" charset="0"/>
-                          <a:cs typeface="Calibri" panose="020F0502020204030204" pitchFamily="34" charset="0"/>
-                        </a:rPr>
-                        <a:t> = 0.0001</a:t>
-                      </a:r>
-                    </a:p>
-                  </a:txBody>
-                  <a:tcPr/>
-                </a:tc>
-                <a:tc>
-                  <a:txBody>
-                    <a:bodyPr/>
-                    <a:lstStyle/>
-                    <a:p>
-                      <a:r>
-                        <a:rPr lang="en-US">
-                          <a:latin typeface="Calibri" panose="020F0502020204030204" pitchFamily="34" charset="0"/>
-                          <a:cs typeface="Calibri" panose="020F0502020204030204" pitchFamily="34" charset="0"/>
-                        </a:rPr>
-                        <a:t>4.231278</a:t>
-                      </a:r>
-                    </a:p>
-                  </a:txBody>
-                  <a:tcPr/>
-                </a:tc>
-                <a:extLst>
-                  <a:ext uri="{0D108BD9-81ED-4DB2-BD59-A6C34878D82A}">
-                    <a16:rowId xmlns:a16="http://schemas.microsoft.com/office/drawing/2014/main" val="205126545"/>
-                  </a:ext>
-                </a:extLst>
-              </a:tr>
-              <a:tr h="370840">
-                <a:tc>
-                  <a:txBody>
-                    <a:bodyPr/>
-                    <a:lstStyle/>
-                    <a:p>
-                      <a:r>
-                        <a:rPr lang="en-US">
-                          <a:latin typeface="Calibri" panose="020F0502020204030204" pitchFamily="34" charset="0"/>
-                          <a:cs typeface="Calibri" panose="020F0502020204030204" pitchFamily="34" charset="0"/>
-                        </a:rPr>
-                        <a:t>Ridge regression – Normalized with various </a:t>
-                      </a:r>
-                      <a:r>
-                        <a:rPr lang="el-GR">
-                          <a:latin typeface="Calibri" panose="020F0502020204030204" pitchFamily="34" charset="0"/>
-                          <a:cs typeface="Calibri" panose="020F0502020204030204" pitchFamily="34" charset="0"/>
-                        </a:rPr>
-                        <a:t>α</a:t>
-                      </a:r>
-                      <a:endParaRPr lang="en-US">
-                        <a:latin typeface="Calibri" panose="020F0502020204030204" pitchFamily="34" charset="0"/>
-                        <a:cs typeface="Calibri" panose="020F0502020204030204" pitchFamily="34" charset="0"/>
-                      </a:endParaRPr>
-                    </a:p>
-                  </a:txBody>
-                  <a:tcPr/>
-                </a:tc>
-                <a:tc>
-                  <a:txBody>
-                    <a:bodyPr/>
-                    <a:lstStyle/>
-                    <a:p>
-                      <a:r>
-                        <a:rPr lang="en-US">
-                          <a:latin typeface="Calibri" panose="020F0502020204030204" pitchFamily="34" charset="0"/>
-                          <a:cs typeface="Calibri" panose="020F0502020204030204" pitchFamily="34" charset="0"/>
-                        </a:rPr>
-                        <a:t>…</a:t>
-                      </a:r>
-                    </a:p>
-                  </a:txBody>
-                  <a:tcPr/>
-                </a:tc>
-                <a:extLst>
-                  <a:ext uri="{0D108BD9-81ED-4DB2-BD59-A6C34878D82A}">
-                    <a16:rowId xmlns:a16="http://schemas.microsoft.com/office/drawing/2014/main" val="3546550046"/>
-                  </a:ext>
-                </a:extLst>
-              </a:tr>
-              <a:tr h="370840">
-                <a:tc>
-                  <a:txBody>
-                    <a:bodyPr/>
-                    <a:lstStyle/>
-                    <a:p>
-                      <a:r>
-                        <a:rPr lang="en-US">
-                          <a:latin typeface="Calibri" panose="020F0502020204030204" pitchFamily="34" charset="0"/>
-                          <a:cs typeface="Calibri" panose="020F0502020204030204" pitchFamily="34" charset="0"/>
-                        </a:rPr>
-                        <a:t>Ridge regression – </a:t>
-                      </a:r>
-                      <a:r>
-                        <a:rPr lang="el-GR">
-                          <a:latin typeface="Calibri" panose="020F0502020204030204" pitchFamily="34" charset="0"/>
-                          <a:cs typeface="Calibri" panose="020F0502020204030204" pitchFamily="34" charset="0"/>
-                        </a:rPr>
-                        <a:t>α</a:t>
-                      </a:r>
-                      <a:r>
-                        <a:rPr lang="en-US">
-                          <a:latin typeface="Calibri" panose="020F0502020204030204" pitchFamily="34" charset="0"/>
-                          <a:cs typeface="Calibri" panose="020F0502020204030204" pitchFamily="34" charset="0"/>
-                        </a:rPr>
-                        <a:t> = 0.0001</a:t>
-                      </a:r>
-                    </a:p>
-                  </a:txBody>
-                  <a:tcPr/>
-                </a:tc>
-                <a:tc>
-                  <a:txBody>
-                    <a:bodyPr/>
-                    <a:lstStyle/>
-                    <a:p>
-                      <a:r>
-                        <a:rPr lang="en-US">
-                          <a:latin typeface="Calibri" panose="020F0502020204030204" pitchFamily="34" charset="0"/>
-                          <a:cs typeface="Calibri" panose="020F0502020204030204" pitchFamily="34" charset="0"/>
-                        </a:rPr>
-                        <a:t>4.532076</a:t>
-                      </a:r>
-                    </a:p>
-                  </a:txBody>
-                  <a:tcPr/>
-                </a:tc>
-                <a:extLst>
-                  <a:ext uri="{0D108BD9-81ED-4DB2-BD59-A6C34878D82A}">
-                    <a16:rowId xmlns:a16="http://schemas.microsoft.com/office/drawing/2014/main" val="2900962001"/>
-                  </a:ext>
-                </a:extLst>
-              </a:tr>
-              <a:tr h="370840">
-                <a:tc>
-                  <a:txBody>
-                    <a:bodyPr/>
-                    <a:lstStyle/>
-                    <a:p>
-                      <a:r>
-                        <a:rPr lang="en-US">
-                          <a:latin typeface="Calibri" panose="020F0502020204030204" pitchFamily="34" charset="0"/>
-                          <a:cs typeface="Calibri" panose="020F0502020204030204" pitchFamily="34" charset="0"/>
-                        </a:rPr>
-                        <a:t>Ridge regression – various </a:t>
-                      </a:r>
-                      <a:r>
-                        <a:rPr lang="el-GR">
-                          <a:latin typeface="Calibri" panose="020F0502020204030204" pitchFamily="34" charset="0"/>
-                          <a:cs typeface="Calibri" panose="020F0502020204030204" pitchFamily="34" charset="0"/>
-                        </a:rPr>
-                        <a:t>α</a:t>
-                      </a:r>
-                      <a:endParaRPr lang="en-US">
-                        <a:latin typeface="Calibri" panose="020F0502020204030204" pitchFamily="34" charset="0"/>
-                        <a:cs typeface="Calibri" panose="020F0502020204030204" pitchFamily="34" charset="0"/>
-                      </a:endParaRPr>
-                    </a:p>
-                  </a:txBody>
-                  <a:tcPr/>
-                </a:tc>
-                <a:tc>
-                  <a:txBody>
-                    <a:bodyPr/>
-                    <a:lstStyle/>
-                    <a:p>
-                      <a:r>
-                        <a:rPr lang="en-US">
-                          <a:latin typeface="Calibri" panose="020F0502020204030204" pitchFamily="34" charset="0"/>
-                          <a:cs typeface="Calibri" panose="020F0502020204030204" pitchFamily="34" charset="0"/>
-                        </a:rPr>
-                        <a:t>…</a:t>
-                      </a:r>
-                    </a:p>
-                  </a:txBody>
-                  <a:tcPr/>
-                </a:tc>
-                <a:extLst>
-                  <a:ext uri="{0D108BD9-81ED-4DB2-BD59-A6C34878D82A}">
-                    <a16:rowId xmlns:a16="http://schemas.microsoft.com/office/drawing/2014/main" val="3609034545"/>
-                  </a:ext>
-                </a:extLst>
-              </a:tr>
-              <a:tr h="370840">
-                <a:tc>
-                  <a:txBody>
-                    <a:bodyPr/>
-                    <a:lstStyle/>
-                    <a:p>
-                      <a:r>
-                        <a:rPr lang="en-US">
-                          <a:latin typeface="Calibri" panose="020F0502020204030204" pitchFamily="34" charset="0"/>
-                          <a:cs typeface="Calibri" panose="020F0502020204030204" pitchFamily="34" charset="0"/>
-                        </a:rPr>
-                        <a:t>Linear Regression – default</a:t>
-                      </a:r>
-                    </a:p>
-                  </a:txBody>
-                  <a:tcPr/>
-                </a:tc>
-                <a:tc>
-                  <a:txBody>
-                    <a:bodyPr/>
-                    <a:lstStyle/>
-                    <a:p>
-                      <a:r>
-                        <a:rPr lang="en-US">
-                          <a:latin typeface="Calibri" panose="020F0502020204030204" pitchFamily="34" charset="0"/>
-                          <a:cs typeface="Calibri" panose="020F0502020204030204" pitchFamily="34" charset="0"/>
-                        </a:rPr>
-                        <a:t>4.532554</a:t>
-                      </a:r>
-                    </a:p>
-                  </a:txBody>
-                  <a:tcPr/>
-                </a:tc>
-                <a:extLst>
-                  <a:ext uri="{0D108BD9-81ED-4DB2-BD59-A6C34878D82A}">
-                    <a16:rowId xmlns:a16="http://schemas.microsoft.com/office/drawing/2014/main" val="3922227572"/>
-                  </a:ext>
-                </a:extLst>
-              </a:tr>
-              <a:tr h="370840">
-                <a:tc>
-                  <a:txBody>
-                    <a:bodyPr/>
-                    <a:lstStyle/>
-                    <a:p>
-                      <a:r>
-                        <a:rPr lang="en-US">
-                          <a:latin typeface="Calibri" panose="020F0502020204030204" pitchFamily="34" charset="0"/>
-                          <a:cs typeface="Calibri" panose="020F0502020204030204" pitchFamily="34" charset="0"/>
-                        </a:rPr>
-                        <a:t>Lasso Regression – Normalized – </a:t>
-                      </a:r>
-                      <a:r>
-                        <a:rPr lang="el-GR">
-                          <a:latin typeface="Calibri" panose="020F0502020204030204" pitchFamily="34" charset="0"/>
-                          <a:cs typeface="Calibri" panose="020F0502020204030204" pitchFamily="34" charset="0"/>
-                        </a:rPr>
-                        <a:t>α</a:t>
-                      </a:r>
-                      <a:r>
-                        <a:rPr lang="en-US">
-                          <a:latin typeface="Calibri" panose="020F0502020204030204" pitchFamily="34" charset="0"/>
-                          <a:cs typeface="Calibri" panose="020F0502020204030204" pitchFamily="34" charset="0"/>
-                        </a:rPr>
-                        <a:t> = 0.0001</a:t>
-                      </a:r>
-                    </a:p>
-                  </a:txBody>
-                  <a:tcPr/>
-                </a:tc>
-                <a:tc>
-                  <a:txBody>
-                    <a:bodyPr/>
-                    <a:lstStyle/>
-                    <a:p>
-                      <a:r>
-                        <a:rPr lang="en-US">
-                          <a:latin typeface="Calibri" panose="020F0502020204030204" pitchFamily="34" charset="0"/>
-                          <a:cs typeface="Calibri" panose="020F0502020204030204" pitchFamily="34" charset="0"/>
-                        </a:rPr>
-                        <a:t>5.529481</a:t>
-                      </a:r>
-                    </a:p>
-                  </a:txBody>
-                  <a:tcPr/>
-                </a:tc>
-                <a:extLst>
-                  <a:ext uri="{0D108BD9-81ED-4DB2-BD59-A6C34878D82A}">
-                    <a16:rowId xmlns:a16="http://schemas.microsoft.com/office/drawing/2014/main" val="3633714497"/>
-                  </a:ext>
-                </a:extLst>
-              </a:tr>
-              <a:tr h="370840">
-                <a:tc>
-                  <a:txBody>
-                    <a:bodyPr/>
-                    <a:lstStyle/>
-                    <a:p>
-                      <a:pPr marL="0" marR="0" lvl="0" indent="0" algn="l" defTabSz="457200" rtl="0" eaLnBrk="1" fontAlgn="auto" latinLnBrk="0" hangingPunct="1">
-                        <a:lnSpc>
-                          <a:spcPct val="100000"/>
-                        </a:lnSpc>
-                        <a:spcBef>
-                          <a:spcPts val="0"/>
-                        </a:spcBef>
-                        <a:spcAft>
-                          <a:spcPts val="0"/>
-                        </a:spcAft>
-                        <a:buClrTx/>
-                        <a:buSzTx/>
-                        <a:buFontTx/>
-                        <a:buNone/>
-                        <a:tabLst/>
-                        <a:defRPr/>
-                      </a:pPr>
-                      <a:r>
-                        <a:rPr lang="en-US">
-                          <a:latin typeface="Calibri" panose="020F0502020204030204" pitchFamily="34" charset="0"/>
-                          <a:cs typeface="Calibri" panose="020F0502020204030204" pitchFamily="34" charset="0"/>
-                        </a:rPr>
-                        <a:t>Lasso Regression – </a:t>
-                      </a:r>
-                      <a:r>
-                        <a:rPr lang="el-GR">
-                          <a:latin typeface="Calibri" panose="020F0502020204030204" pitchFamily="34" charset="0"/>
-                          <a:cs typeface="Calibri" panose="020F0502020204030204" pitchFamily="34" charset="0"/>
-                        </a:rPr>
-                        <a:t>α</a:t>
-                      </a:r>
-                      <a:r>
-                        <a:rPr lang="en-US">
-                          <a:latin typeface="Calibri" panose="020F0502020204030204" pitchFamily="34" charset="0"/>
-                          <a:cs typeface="Calibri" panose="020F0502020204030204" pitchFamily="34" charset="0"/>
-                        </a:rPr>
-                        <a:t> = 0.0001</a:t>
-                      </a:r>
-                    </a:p>
-                  </a:txBody>
-                  <a:tcPr/>
-                </a:tc>
-                <a:tc>
-                  <a:txBody>
-                    <a:bodyPr/>
-                    <a:lstStyle/>
-                    <a:p>
-                      <a:r>
-                        <a:rPr lang="en-US">
-                          <a:latin typeface="Calibri" panose="020F0502020204030204" pitchFamily="34" charset="0"/>
-                          <a:cs typeface="Calibri" panose="020F0502020204030204" pitchFamily="34" charset="0"/>
-                        </a:rPr>
-                        <a:t>5.703381</a:t>
-                      </a:r>
-                    </a:p>
-                  </a:txBody>
-                  <a:tcPr/>
-                </a:tc>
-                <a:extLst>
-                  <a:ext uri="{0D108BD9-81ED-4DB2-BD59-A6C34878D82A}">
-                    <a16:rowId xmlns:a16="http://schemas.microsoft.com/office/drawing/2014/main" val="1948085660"/>
-                  </a:ext>
-                </a:extLst>
-              </a:tr>
-            </a:tbl>
+          <a:graphicData uri="http://schemas.openxmlformats.org/drawingml/2006/chart">
+            <c:chart xmlns:c="http://schemas.openxmlformats.org/drawingml/2006/chart" xmlns:r="http://schemas.openxmlformats.org/officeDocument/2006/relationships" r:id="rId2"/>
           </a:graphicData>
         </a:graphic>
       </p:graphicFrame>
@@ -13721,639 +14723,6 @@
           <p:cNvPr id="2" name="Title 1">
             <a:extLst>
               <a:ext uri="{FF2B5EF4-FFF2-40B4-BE49-F238E27FC236}">
-                <a16:creationId xmlns:a16="http://schemas.microsoft.com/office/drawing/2014/main" id="{70735CED-8E86-4079-A02A-418AD9176977}"/>
-              </a:ext>
-            </a:extLst>
-          </p:cNvPr>
-          <p:cNvSpPr>
-            <a:spLocks noGrp="1"/>
-          </p:cNvSpPr>
-          <p:nvPr>
-            <p:ph type="title"/>
-          </p:nvPr>
-        </p:nvSpPr>
-        <p:spPr>
-          <a:xfrm>
-            <a:off x="1484311" y="0"/>
-            <a:ext cx="10018712" cy="1969546"/>
-          </a:xfrm>
-        </p:spPr>
-        <p:txBody>
-          <a:bodyPr/>
-          <a:lstStyle/>
-          <a:p>
-            <a:r>
-              <a:rPr lang="en-US">
-                <a:latin typeface="Calibri" panose="020F0502020204030204" pitchFamily="34" charset="0"/>
-                <a:cs typeface="Calibri" panose="020F0502020204030204" pitchFamily="34" charset="0"/>
-              </a:rPr>
-              <a:t>Validation Results</a:t>
-            </a:r>
-          </a:p>
-        </p:txBody>
-      </p:sp>
-      <p:sp>
-        <p:nvSpPr>
-          <p:cNvPr id="6" name="Text Placeholder 5">
-            <a:extLst>
-              <a:ext uri="{FF2B5EF4-FFF2-40B4-BE49-F238E27FC236}">
-                <a16:creationId xmlns:a16="http://schemas.microsoft.com/office/drawing/2014/main" id="{A33C27FA-21EF-4DF0-BB67-AE712968306D}"/>
-              </a:ext>
-            </a:extLst>
-          </p:cNvPr>
-          <p:cNvSpPr>
-            <a:spLocks noGrp="1"/>
-          </p:cNvSpPr>
-          <p:nvPr>
-            <p:ph type="body" sz="quarter" idx="13"/>
-          </p:nvPr>
-        </p:nvSpPr>
-        <p:spPr>
-          <a:xfrm>
-            <a:off x="1484310" y="1484351"/>
-            <a:ext cx="10018713" cy="838200"/>
-          </a:xfrm>
-        </p:spPr>
-        <p:txBody>
-          <a:bodyPr>
-            <a:normAutofit fontScale="85000" lnSpcReduction="20000"/>
-          </a:bodyPr>
-          <a:lstStyle/>
-          <a:p>
-            <a:pPr marL="457200" indent="-457200">
-              <a:buFont typeface="Arial" panose="020B0604020202020204" pitchFamily="34" charset="0"/>
-              <a:buChar char="•"/>
-            </a:pPr>
-            <a:r>
-              <a:rPr lang="en-US">
-                <a:latin typeface="Calibri" panose="020F0502020204030204" pitchFamily="34" charset="0"/>
-                <a:cs typeface="Calibri" panose="020F0502020204030204" pitchFamily="34" charset="0"/>
-              </a:rPr>
-              <a:t>But how do they perform in reality?</a:t>
-            </a:r>
-          </a:p>
-          <a:p>
-            <a:pPr marL="457200" indent="-457200">
-              <a:buFont typeface="Arial" panose="020B0604020202020204" pitchFamily="34" charset="0"/>
-              <a:buChar char="•"/>
-            </a:pPr>
-            <a:r>
-              <a:rPr lang="en-US">
-                <a:latin typeface="Calibri" panose="020F0502020204030204" pitchFamily="34" charset="0"/>
-                <a:cs typeface="Calibri" panose="020F0502020204030204" pitchFamily="34" charset="0"/>
-              </a:rPr>
-              <a:t>Regular run – no cross-validation:</a:t>
-            </a:r>
-          </a:p>
-        </p:txBody>
-      </p:sp>
-      <p:graphicFrame>
-        <p:nvGraphicFramePr>
-          <p:cNvPr id="9" name="Table 9">
-            <a:extLst>
-              <a:ext uri="{FF2B5EF4-FFF2-40B4-BE49-F238E27FC236}">
-                <a16:creationId xmlns:a16="http://schemas.microsoft.com/office/drawing/2014/main" id="{C331D44D-BA64-459F-9457-1D3BF9B64E0A}"/>
-              </a:ext>
-            </a:extLst>
-          </p:cNvPr>
-          <p:cNvGraphicFramePr>
-            <a:graphicFrameLocks noGrp="1"/>
-          </p:cNvGraphicFramePr>
-          <p:nvPr>
-            <p:ph idx="4294967295"/>
-            <p:extLst>
-              <p:ext uri="{D42A27DB-BD31-4B8C-83A1-F6EECF244321}">
-                <p14:modId xmlns:p14="http://schemas.microsoft.com/office/powerpoint/2010/main" val="1423880871"/>
-              </p:ext>
-            </p:extLst>
-          </p:nvPr>
-        </p:nvGraphicFramePr>
-        <p:xfrm>
-          <a:off x="1484311" y="2439019"/>
-          <a:ext cx="10018712" cy="4079240"/>
-        </p:xfrm>
-        <a:graphic>
-          <a:graphicData uri="http://schemas.openxmlformats.org/drawingml/2006/table">
-            <a:tbl>
-              <a:tblPr firstRow="1" bandRow="1">
-                <a:tableStyleId>{5C22544A-7EE6-4342-B048-85BDC9FD1C3A}</a:tableStyleId>
-              </a:tblPr>
-              <a:tblGrid>
-                <a:gridCol w="5259389">
-                  <a:extLst>
-                    <a:ext uri="{9D8B030D-6E8A-4147-A177-3AD203B41FA5}">
-                      <a16:colId xmlns:a16="http://schemas.microsoft.com/office/drawing/2014/main" val="379410938"/>
-                    </a:ext>
-                  </a:extLst>
-                </a:gridCol>
-                <a:gridCol w="4759323">
-                  <a:extLst>
-                    <a:ext uri="{9D8B030D-6E8A-4147-A177-3AD203B41FA5}">
-                      <a16:colId xmlns:a16="http://schemas.microsoft.com/office/drawing/2014/main" val="3620682440"/>
-                    </a:ext>
-                  </a:extLst>
-                </a:gridCol>
-              </a:tblGrid>
-              <a:tr h="370840">
-                <a:tc>
-                  <a:txBody>
-                    <a:bodyPr/>
-                    <a:lstStyle/>
-                    <a:p>
-                      <a:r>
-                        <a:rPr lang="en-US">
-                          <a:latin typeface="Calibri" panose="020F0502020204030204" pitchFamily="34" charset="0"/>
-                          <a:cs typeface="Calibri" panose="020F0502020204030204" pitchFamily="34" charset="0"/>
-                        </a:rPr>
-                        <a:t>Model</a:t>
-                      </a:r>
-                    </a:p>
-                  </a:txBody>
-                  <a:tcPr/>
-                </a:tc>
-                <a:tc>
-                  <a:txBody>
-                    <a:bodyPr/>
-                    <a:lstStyle/>
-                    <a:p>
-                      <a:r>
-                        <a:rPr lang="en-US">
-                          <a:latin typeface="Calibri" panose="020F0502020204030204" pitchFamily="34" charset="0"/>
-                          <a:cs typeface="Calibri" panose="020F0502020204030204" pitchFamily="34" charset="0"/>
-                        </a:rPr>
-                        <a:t>Root Mean Square Error</a:t>
-                      </a:r>
-                    </a:p>
-                  </a:txBody>
-                  <a:tcPr/>
-                </a:tc>
-                <a:extLst>
-                  <a:ext uri="{0D108BD9-81ED-4DB2-BD59-A6C34878D82A}">
-                    <a16:rowId xmlns:a16="http://schemas.microsoft.com/office/drawing/2014/main" val="2463943391"/>
-                  </a:ext>
-                </a:extLst>
-              </a:tr>
-              <a:tr h="370840">
-                <a:tc>
-                  <a:txBody>
-                    <a:bodyPr/>
-                    <a:lstStyle/>
-                    <a:p>
-                      <a:r>
-                        <a:rPr lang="en-US">
-                          <a:latin typeface="Calibri" panose="020F0502020204030204" pitchFamily="34" charset="0"/>
-                          <a:cs typeface="Calibri" panose="020F0502020204030204" pitchFamily="34" charset="0"/>
-                        </a:rPr>
-                        <a:t>Lasso Regression – Normalized data – various alpha</a:t>
-                      </a:r>
-                    </a:p>
-                  </a:txBody>
-                  <a:tcPr/>
-                </a:tc>
-                <a:tc>
-                  <a:txBody>
-                    <a:bodyPr/>
-                    <a:lstStyle/>
-                    <a:p>
-                      <a:r>
-                        <a:rPr lang="en-US">
-                          <a:latin typeface="Calibri" panose="020F0502020204030204" pitchFamily="34" charset="0"/>
-                          <a:cs typeface="Calibri" panose="020F0502020204030204" pitchFamily="34" charset="0"/>
-                        </a:rPr>
-                        <a:t>8.108839</a:t>
-                      </a:r>
-                    </a:p>
-                  </a:txBody>
-                  <a:tcPr/>
-                </a:tc>
-                <a:extLst>
-                  <a:ext uri="{0D108BD9-81ED-4DB2-BD59-A6C34878D82A}">
-                    <a16:rowId xmlns:a16="http://schemas.microsoft.com/office/drawing/2014/main" val="3711726048"/>
-                  </a:ext>
-                </a:extLst>
-              </a:tr>
-              <a:tr h="370840">
-                <a:tc>
-                  <a:txBody>
-                    <a:bodyPr/>
-                    <a:lstStyle/>
-                    <a:p>
-                      <a:r>
-                        <a:rPr lang="it-IT">
-                          <a:latin typeface="Calibri" panose="020F0502020204030204" pitchFamily="34" charset="0"/>
-                          <a:cs typeface="Calibri" panose="020F0502020204030204" pitchFamily="34" charset="0"/>
-                        </a:rPr>
-                        <a:t>Lasso Regression – various alpha</a:t>
-                      </a:r>
-                    </a:p>
-                  </a:txBody>
-                  <a:tcPr/>
-                </a:tc>
-                <a:tc>
-                  <a:txBody>
-                    <a:bodyPr/>
-                    <a:lstStyle/>
-                    <a:p>
-                      <a:r>
-                        <a:rPr lang="it-IT">
-                          <a:latin typeface="Calibri" panose="020F0502020204030204" pitchFamily="34" charset="0"/>
-                          <a:cs typeface="Calibri" panose="020F0502020204030204" pitchFamily="34" charset="0"/>
-                        </a:rPr>
-                        <a:t>8.108839</a:t>
-                      </a:r>
-                      <a:endParaRPr lang="en-US">
-                        <a:latin typeface="Calibri" panose="020F0502020204030204" pitchFamily="34" charset="0"/>
-                        <a:cs typeface="Calibri" panose="020F0502020204030204" pitchFamily="34" charset="0"/>
-                      </a:endParaRPr>
-                    </a:p>
-                  </a:txBody>
-                  <a:tcPr/>
-                </a:tc>
-                <a:extLst>
-                  <a:ext uri="{0D108BD9-81ED-4DB2-BD59-A6C34878D82A}">
-                    <a16:rowId xmlns:a16="http://schemas.microsoft.com/office/drawing/2014/main" val="1146705960"/>
-                  </a:ext>
-                </a:extLst>
-              </a:tr>
-              <a:tr h="370840">
-                <a:tc>
-                  <a:txBody>
-                    <a:bodyPr/>
-                    <a:lstStyle/>
-                    <a:p>
-                      <a:r>
-                        <a:rPr lang="it-IT">
-                          <a:latin typeface="Calibri" panose="020F0502020204030204" pitchFamily="34" charset="0"/>
-                          <a:cs typeface="Calibri" panose="020F0502020204030204" pitchFamily="34" charset="0"/>
-                        </a:rPr>
-                        <a:t>Lasso Regression – various alpha and normalization</a:t>
-                      </a:r>
-                    </a:p>
-                  </a:txBody>
-                  <a:tcPr/>
-                </a:tc>
-                <a:tc>
-                  <a:txBody>
-                    <a:bodyPr/>
-                    <a:lstStyle/>
-                    <a:p>
-                      <a:r>
-                        <a:rPr lang="en-US">
-                          <a:latin typeface="Calibri" panose="020F0502020204030204" pitchFamily="34" charset="0"/>
-                          <a:cs typeface="Calibri" panose="020F0502020204030204" pitchFamily="34" charset="0"/>
-                        </a:rPr>
-                        <a:t>…</a:t>
-                      </a:r>
-                    </a:p>
-                  </a:txBody>
-                  <a:tcPr/>
-                </a:tc>
-                <a:extLst>
-                  <a:ext uri="{0D108BD9-81ED-4DB2-BD59-A6C34878D82A}">
-                    <a16:rowId xmlns:a16="http://schemas.microsoft.com/office/drawing/2014/main" val="3262169089"/>
-                  </a:ext>
-                </a:extLst>
-              </a:tr>
-              <a:tr h="370840">
-                <a:tc>
-                  <a:txBody>
-                    <a:bodyPr/>
-                    <a:lstStyle/>
-                    <a:p>
-                      <a:r>
-                        <a:rPr lang="en-US">
-                          <a:latin typeface="Calibri" panose="020F0502020204030204" pitchFamily="34" charset="0"/>
-                          <a:cs typeface="Calibri" panose="020F0502020204030204" pitchFamily="34" charset="0"/>
-                        </a:rPr>
-                        <a:t>Ridge Regression – Normalized - Alpha=10000</a:t>
-                      </a:r>
-                    </a:p>
-                  </a:txBody>
-                  <a:tcPr/>
-                </a:tc>
-                <a:tc>
-                  <a:txBody>
-                    <a:bodyPr/>
-                    <a:lstStyle/>
-                    <a:p>
-                      <a:r>
-                        <a:rPr lang="en-US">
-                          <a:latin typeface="Calibri" panose="020F0502020204030204" pitchFamily="34" charset="0"/>
-                          <a:cs typeface="Calibri" panose="020F0502020204030204" pitchFamily="34" charset="0"/>
-                        </a:rPr>
-                        <a:t>8.111026</a:t>
-                      </a:r>
-                    </a:p>
-                  </a:txBody>
-                  <a:tcPr/>
-                </a:tc>
-                <a:extLst>
-                  <a:ext uri="{0D108BD9-81ED-4DB2-BD59-A6C34878D82A}">
-                    <a16:rowId xmlns:a16="http://schemas.microsoft.com/office/drawing/2014/main" val="205126545"/>
-                  </a:ext>
-                </a:extLst>
-              </a:tr>
-              <a:tr h="370840">
-                <a:tc>
-                  <a:txBody>
-                    <a:bodyPr/>
-                    <a:lstStyle/>
-                    <a:p>
-                      <a:r>
-                        <a:rPr lang="en-US">
-                          <a:latin typeface="Calibri" panose="020F0502020204030204" pitchFamily="34" charset="0"/>
-                          <a:cs typeface="Calibri" panose="020F0502020204030204" pitchFamily="34" charset="0"/>
-                        </a:rPr>
-                        <a:t>Ridge Regression – Normalized with various </a:t>
-                      </a:r>
-                      <a:r>
-                        <a:rPr lang="el-GR">
-                          <a:latin typeface="Calibri" panose="020F0502020204030204" pitchFamily="34" charset="0"/>
-                          <a:cs typeface="Calibri" panose="020F0502020204030204" pitchFamily="34" charset="0"/>
-                        </a:rPr>
-                        <a:t>α</a:t>
-                      </a:r>
-                      <a:endParaRPr lang="en-US">
-                        <a:latin typeface="Calibri" panose="020F0502020204030204" pitchFamily="34" charset="0"/>
-                        <a:cs typeface="Calibri" panose="020F0502020204030204" pitchFamily="34" charset="0"/>
-                      </a:endParaRPr>
-                    </a:p>
-                  </a:txBody>
-                  <a:tcPr/>
-                </a:tc>
-                <a:tc>
-                  <a:txBody>
-                    <a:bodyPr/>
-                    <a:lstStyle/>
-                    <a:p>
-                      <a:r>
-                        <a:rPr lang="en-US">
-                          <a:latin typeface="Calibri" panose="020F0502020204030204" pitchFamily="34" charset="0"/>
-                          <a:cs typeface="Calibri" panose="020F0502020204030204" pitchFamily="34" charset="0"/>
-                        </a:rPr>
-                        <a:t>…</a:t>
-                      </a:r>
-                    </a:p>
-                  </a:txBody>
-                  <a:tcPr/>
-                </a:tc>
-                <a:extLst>
-                  <a:ext uri="{0D108BD9-81ED-4DB2-BD59-A6C34878D82A}">
-                    <a16:rowId xmlns:a16="http://schemas.microsoft.com/office/drawing/2014/main" val="3546550046"/>
-                  </a:ext>
-                </a:extLst>
-              </a:tr>
-              <a:tr h="370840">
-                <a:tc>
-                  <a:txBody>
-                    <a:bodyPr/>
-                    <a:lstStyle/>
-                    <a:p>
-                      <a:r>
-                        <a:rPr lang="en-US">
-                          <a:latin typeface="Calibri" panose="020F0502020204030204" pitchFamily="34" charset="0"/>
-                          <a:cs typeface="Calibri" panose="020F0502020204030204" pitchFamily="34" charset="0"/>
-                        </a:rPr>
-                        <a:t>Linear Regression – Normalized data</a:t>
-                      </a:r>
-                    </a:p>
-                  </a:txBody>
-                  <a:tcPr/>
-                </a:tc>
-                <a:tc>
-                  <a:txBody>
-                    <a:bodyPr/>
-                    <a:lstStyle/>
-                    <a:p>
-                      <a:r>
-                        <a:rPr lang="en-US" b="1">
-                          <a:latin typeface="Calibri" panose="020F0502020204030204" pitchFamily="34" charset="0"/>
-                          <a:cs typeface="Calibri" panose="020F0502020204030204" pitchFamily="34" charset="0"/>
-                        </a:rPr>
-                        <a:t>9.618984</a:t>
-                      </a:r>
-                    </a:p>
-                  </a:txBody>
-                  <a:tcPr/>
-                </a:tc>
-                <a:extLst>
-                  <a:ext uri="{0D108BD9-81ED-4DB2-BD59-A6C34878D82A}">
-                    <a16:rowId xmlns:a16="http://schemas.microsoft.com/office/drawing/2014/main" val="2900962001"/>
-                  </a:ext>
-                </a:extLst>
-              </a:tr>
-              <a:tr h="370840">
-                <a:tc>
-                  <a:txBody>
-                    <a:bodyPr/>
-                    <a:lstStyle/>
-                    <a:p>
-                      <a:r>
-                        <a:rPr lang="en-US">
-                          <a:latin typeface="Calibri" panose="020F0502020204030204" pitchFamily="34" charset="0"/>
-                          <a:cs typeface="Calibri" panose="020F0502020204030204" pitchFamily="34" charset="0"/>
-                        </a:rPr>
-                        <a:t>…</a:t>
-                      </a:r>
-                    </a:p>
-                  </a:txBody>
-                  <a:tcPr/>
-                </a:tc>
-                <a:tc>
-                  <a:txBody>
-                    <a:bodyPr/>
-                    <a:lstStyle/>
-                    <a:p>
-                      <a:r>
-                        <a:rPr lang="en-US">
-                          <a:latin typeface="Calibri" panose="020F0502020204030204" pitchFamily="34" charset="0"/>
-                          <a:cs typeface="Calibri" panose="020F0502020204030204" pitchFamily="34" charset="0"/>
-                        </a:rPr>
-                        <a:t>…</a:t>
-                      </a:r>
-                    </a:p>
-                  </a:txBody>
-                  <a:tcPr/>
-                </a:tc>
-                <a:extLst>
-                  <a:ext uri="{0D108BD9-81ED-4DB2-BD59-A6C34878D82A}">
-                    <a16:rowId xmlns:a16="http://schemas.microsoft.com/office/drawing/2014/main" val="3609034545"/>
-                  </a:ext>
-                </a:extLst>
-              </a:tr>
-              <a:tr h="370840">
-                <a:tc>
-                  <a:txBody>
-                    <a:bodyPr/>
-                    <a:lstStyle/>
-                    <a:p>
-                      <a:r>
-                        <a:rPr lang="en-US">
-                          <a:latin typeface="Calibri" panose="020F0502020204030204" pitchFamily="34" charset="0"/>
-                          <a:cs typeface="Calibri" panose="020F0502020204030204" pitchFamily="34" charset="0"/>
-                        </a:rPr>
-                        <a:t>Linear Regression</a:t>
-                      </a:r>
-                    </a:p>
-                  </a:txBody>
-                  <a:tcPr/>
-                </a:tc>
-                <a:tc>
-                  <a:txBody>
-                    <a:bodyPr/>
-                    <a:lstStyle/>
-                    <a:p>
-                      <a:r>
-                        <a:rPr lang="en-US">
-                          <a:latin typeface="Calibri" panose="020F0502020204030204" pitchFamily="34" charset="0"/>
-                          <a:cs typeface="Calibri" panose="020F0502020204030204" pitchFamily="34" charset="0"/>
-                        </a:rPr>
-                        <a:t>10.111103</a:t>
-                      </a:r>
-                    </a:p>
-                  </a:txBody>
-                  <a:tcPr/>
-                </a:tc>
-                <a:extLst>
-                  <a:ext uri="{0D108BD9-81ED-4DB2-BD59-A6C34878D82A}">
-                    <a16:rowId xmlns:a16="http://schemas.microsoft.com/office/drawing/2014/main" val="3922227572"/>
-                  </a:ext>
-                </a:extLst>
-              </a:tr>
-              <a:tr h="370840">
-                <a:tc>
-                  <a:txBody>
-                    <a:bodyPr/>
-                    <a:lstStyle/>
-                    <a:p>
-                      <a:r>
-                        <a:rPr lang="en-US">
-                          <a:latin typeface="Calibri" panose="020F0502020204030204" pitchFamily="34" charset="0"/>
-                          <a:cs typeface="Calibri" panose="020F0502020204030204" pitchFamily="34" charset="0"/>
-                        </a:rPr>
-                        <a:t>…</a:t>
-                      </a:r>
-                    </a:p>
-                  </a:txBody>
-                  <a:tcPr/>
-                </a:tc>
-                <a:tc>
-                  <a:txBody>
-                    <a:bodyPr/>
-                    <a:lstStyle/>
-                    <a:p>
-                      <a:r>
-                        <a:rPr lang="en-US">
-                          <a:latin typeface="Calibri" panose="020F0502020204030204" pitchFamily="34" charset="0"/>
-                          <a:cs typeface="Calibri" panose="020F0502020204030204" pitchFamily="34" charset="0"/>
-                        </a:rPr>
-                        <a:t>…</a:t>
-                      </a:r>
-                    </a:p>
-                  </a:txBody>
-                  <a:tcPr/>
-                </a:tc>
-                <a:extLst>
-                  <a:ext uri="{0D108BD9-81ED-4DB2-BD59-A6C34878D82A}">
-                    <a16:rowId xmlns:a16="http://schemas.microsoft.com/office/drawing/2014/main" val="3633714497"/>
-                  </a:ext>
-                </a:extLst>
-              </a:tr>
-              <a:tr h="370840">
-                <a:tc>
-                  <a:txBody>
-                    <a:bodyPr/>
-                    <a:lstStyle/>
-                    <a:p>
-                      <a:pPr marL="0" marR="0" lvl="0" indent="0" algn="l" defTabSz="457200" rtl="0" eaLnBrk="1" fontAlgn="auto" latinLnBrk="0" hangingPunct="1">
-                        <a:lnSpc>
-                          <a:spcPct val="100000"/>
-                        </a:lnSpc>
-                        <a:spcBef>
-                          <a:spcPts val="0"/>
-                        </a:spcBef>
-                        <a:spcAft>
-                          <a:spcPts val="0"/>
-                        </a:spcAft>
-                        <a:buClrTx/>
-                        <a:buSzTx/>
-                        <a:buFontTx/>
-                        <a:buNone/>
-                        <a:tabLst/>
-                        <a:defRPr/>
-                      </a:pPr>
-                      <a:r>
-                        <a:rPr lang="en-US">
-                          <a:latin typeface="Calibri" panose="020F0502020204030204" pitchFamily="34" charset="0"/>
-                          <a:cs typeface="Calibri" panose="020F0502020204030204" pitchFamily="34" charset="0"/>
-                        </a:rPr>
-                        <a:t>Lasso Regression – Alpha=0.0001</a:t>
-                      </a:r>
-                    </a:p>
-                  </a:txBody>
-                  <a:tcPr/>
-                </a:tc>
-                <a:tc>
-                  <a:txBody>
-                    <a:bodyPr/>
-                    <a:lstStyle/>
-                    <a:p>
-                      <a:r>
-                        <a:rPr lang="en-US">
-                          <a:latin typeface="Calibri" panose="020F0502020204030204" pitchFamily="34" charset="0"/>
-                          <a:cs typeface="Calibri" panose="020F0502020204030204" pitchFamily="34" charset="0"/>
-                        </a:rPr>
-                        <a:t>10.614017</a:t>
-                      </a:r>
-                    </a:p>
-                  </a:txBody>
-                  <a:tcPr/>
-                </a:tc>
-                <a:extLst>
-                  <a:ext uri="{0D108BD9-81ED-4DB2-BD59-A6C34878D82A}">
-                    <a16:rowId xmlns:a16="http://schemas.microsoft.com/office/drawing/2014/main" val="1948085660"/>
-                  </a:ext>
-                </a:extLst>
-              </a:tr>
-            </a:tbl>
-          </a:graphicData>
-        </a:graphic>
-      </p:graphicFrame>
-    </p:spTree>
-    <p:extLst>
-      <p:ext uri="{BB962C8B-B14F-4D97-AF65-F5344CB8AC3E}">
-        <p14:creationId xmlns:p14="http://schemas.microsoft.com/office/powerpoint/2010/main" val="4022748608"/>
-      </p:ext>
-    </p:extLst>
-  </p:cSld>
-  <p:clrMapOvr>
-    <a:masterClrMapping/>
-  </p:clrMapOvr>
-</p:sld>
-</file>
-
-<file path=ppt/slides/slide14.xml><?xml version="1.0" encoding="utf-8"?>
-<p:sld xmlns:a="http://schemas.openxmlformats.org/drawingml/2006/main" xmlns:r="http://schemas.openxmlformats.org/officeDocument/2006/relationships" xmlns:p="http://schemas.openxmlformats.org/presentationml/2006/main">
-  <p:cSld>
-    <p:spTree>
-      <p:nvGrpSpPr>
-        <p:cNvPr id="1" name=""/>
-        <p:cNvGrpSpPr/>
-        <p:nvPr/>
-      </p:nvGrpSpPr>
-      <p:grpSpPr>
-        <a:xfrm>
-          <a:off x="0" y="0"/>
-          <a:ext cx="0" cy="0"/>
-          <a:chOff x="0" y="0"/>
-          <a:chExt cx="0" cy="0"/>
-        </a:xfrm>
-      </p:grpSpPr>
-      <p:sp>
-        <p:nvSpPr>
-          <p:cNvPr id="2" name="Title 1">
-            <a:extLst>
-              <a:ext uri="{FF2B5EF4-FFF2-40B4-BE49-F238E27FC236}">
                 <a16:creationId xmlns:a16="http://schemas.microsoft.com/office/drawing/2014/main" id="{00A3A75F-8723-4B71-A61F-C8C634908A5C}"/>
               </a:ext>
             </a:extLst>
@@ -14490,7 +14859,7 @@
 </p:sld>
 </file>
 
-<file path=ppt/slides/slide15.xml><?xml version="1.0" encoding="utf-8"?>
+<file path=ppt/slides/slide14.xml><?xml version="1.0" encoding="utf-8"?>
 <p:sld xmlns:a="http://schemas.openxmlformats.org/drawingml/2006/main" xmlns:r="http://schemas.openxmlformats.org/officeDocument/2006/relationships" xmlns:p="http://schemas.openxmlformats.org/presentationml/2006/main">
   <p:cSld>
     <p:spTree>

</xml_diff>